<commit_message>
update chef mvc order
</commit_message>
<xml_diff>
--- a/1phase/mvc-single-res/HT-MVC.pptx
+++ b/1phase/mvc-single-res/HT-MVC.pptx
@@ -5,10 +5,10 @@
     <p:sldMasterId id="2147483660" r:id="rId1"/>
   </p:sldMasterIdLst>
   <p:notesMasterIdLst>
-    <p:notesMasterId r:id="rId40"/>
+    <p:notesMasterId r:id="rId41"/>
   </p:notesMasterIdLst>
   <p:handoutMasterIdLst>
-    <p:handoutMasterId r:id="rId41"/>
+    <p:handoutMasterId r:id="rId42"/>
   </p:handoutMasterIdLst>
   <p:sldIdLst>
     <p:sldId id="256" r:id="rId2"/>
@@ -38,17 +38,18 @@
     <p:sldId id="280" r:id="rId26"/>
     <p:sldId id="291" r:id="rId27"/>
     <p:sldId id="307" r:id="rId28"/>
-    <p:sldId id="303" r:id="rId29"/>
-    <p:sldId id="304" r:id="rId30"/>
-    <p:sldId id="302" r:id="rId31"/>
-    <p:sldId id="298" r:id="rId32"/>
-    <p:sldId id="301" r:id="rId33"/>
-    <p:sldId id="300" r:id="rId34"/>
-    <p:sldId id="299" r:id="rId35"/>
-    <p:sldId id="297" r:id="rId36"/>
-    <p:sldId id="296" r:id="rId37"/>
-    <p:sldId id="305" r:id="rId38"/>
-    <p:sldId id="292" r:id="rId39"/>
+    <p:sldId id="308" r:id="rId29"/>
+    <p:sldId id="303" r:id="rId30"/>
+    <p:sldId id="304" r:id="rId31"/>
+    <p:sldId id="302" r:id="rId32"/>
+    <p:sldId id="298" r:id="rId33"/>
+    <p:sldId id="301" r:id="rId34"/>
+    <p:sldId id="300" r:id="rId35"/>
+    <p:sldId id="299" r:id="rId36"/>
+    <p:sldId id="297" r:id="rId37"/>
+    <p:sldId id="296" r:id="rId38"/>
+    <p:sldId id="305" r:id="rId39"/>
+    <p:sldId id="292" r:id="rId40"/>
   </p:sldIdLst>
   <p:sldSz cx="9144000" cy="6858000" type="screen4x3"/>
   <p:notesSz cx="6858000" cy="9144000"/>
@@ -2484,6 +2485,48 @@
           <a:lstStyle/>
           <a:p>
             <a:r>
+              <a:rPr lang="en-US" sz="2300" dirty="0"/>
+              <a:t>The </a:t>
+            </a:r>
+            <a:r>
+              <a:rPr lang="en-US" sz="2300" dirty="0">
+                <a:solidFill>
+                  <a:srgbClr val="FF0000"/>
+                </a:solidFill>
+              </a:rPr>
+              <a:t>model (chef)</a:t>
+            </a:r>
+            <a:r>
+              <a:rPr lang="en-US" sz="2300" dirty="0"/>
+              <a:t> handles all the data</a:t>
+            </a:r>
+          </a:p>
+          <a:p>
+            <a:pPr marL="0" indent="0">
+              <a:buNone/>
+            </a:pPr>
+            <a:r>
+              <a:rPr lang="en-US" sz="2300" dirty="0" smtClean="0"/>
+              <a:t>	Interacts </a:t>
+            </a:r>
+            <a:r>
+              <a:rPr lang="en-US" sz="2300" dirty="0"/>
+              <a:t>with a DB, Web API or other data store, crunches the </a:t>
+            </a:r>
+            <a:r>
+              <a:rPr lang="en-US" sz="2300" dirty="0" smtClean="0"/>
+              <a:t>	numbers </a:t>
+            </a:r>
+            <a:r>
+              <a:rPr lang="en-US" sz="2300" dirty="0"/>
+              <a:t>and does the ‘heavy lifting’ in your application.</a:t>
+            </a:r>
+          </a:p>
+          <a:p>
+            <a:endParaRPr lang="en-US" sz="2300" dirty="0" smtClean="0"/>
+          </a:p>
+          <a:p>
+            <a:r>
               <a:rPr lang="en-US" sz="2300" dirty="0" smtClean="0"/>
               <a:t>The </a:t>
             </a:r>
@@ -2501,58 +2544,30 @@
             </a:r>
           </a:p>
           <a:p>
+            <a:pPr marL="0" indent="0">
+              <a:buNone/>
+            </a:pPr>
             <a:r>
               <a:rPr lang="en-US" sz="2300" dirty="0" smtClean="0"/>
-              <a:t>It shows information to the user and gets user input</a:t>
-            </a:r>
-          </a:p>
-          <a:p>
+              <a:t>	</a:t>
+            </a:r>
+            <a:r>
+              <a:rPr lang="en-US" sz="2300" dirty="0"/>
+              <a:t>S</a:t>
+            </a:r>
+            <a:r>
+              <a:rPr lang="en-US" sz="2300" dirty="0" smtClean="0"/>
+              <a:t>hows </a:t>
+            </a:r>
+            <a:r>
+              <a:rPr lang="en-US" sz="2300" dirty="0" smtClean="0"/>
+              <a:t>information to the user and gets user </a:t>
+            </a:r>
+            <a:r>
+              <a:rPr lang="en-US" sz="2300" dirty="0" smtClean="0"/>
+              <a:t>input</a:t>
+            </a:r>
             <a:endParaRPr lang="en-US" sz="2300" dirty="0"/>
-          </a:p>
-          <a:p>
-            <a:r>
-              <a:rPr lang="en-US" sz="2300" dirty="0" smtClean="0"/>
-              <a:t>The </a:t>
-            </a:r>
-            <a:r>
-              <a:rPr lang="en-US" sz="2300" dirty="0" smtClean="0">
-                <a:solidFill>
-                  <a:srgbClr val="FF0000"/>
-                </a:solidFill>
-              </a:rPr>
-              <a:t>model (chef)</a:t>
-            </a:r>
-            <a:r>
-              <a:rPr lang="en-US" sz="2300" dirty="0" smtClean="0"/>
-              <a:t> handles </a:t>
-            </a:r>
-            <a:r>
-              <a:rPr lang="en-US" sz="2300" dirty="0" smtClean="0"/>
-              <a:t>all the data</a:t>
-            </a:r>
-            <a:endParaRPr lang="en-US" sz="2300" dirty="0" smtClean="0"/>
-          </a:p>
-          <a:p>
-            <a:r>
-              <a:rPr lang="en-US" sz="2300" dirty="0" smtClean="0"/>
-              <a:t>It interacts with a </a:t>
-            </a:r>
-            <a:r>
-              <a:rPr lang="en-US" sz="2300" dirty="0" smtClean="0"/>
-              <a:t>DB, Web API </a:t>
-            </a:r>
-            <a:r>
-              <a:rPr lang="en-US" sz="2300" dirty="0" smtClean="0"/>
-              <a:t>or </a:t>
-            </a:r>
-            <a:r>
-              <a:rPr lang="en-US" sz="2300" dirty="0" smtClean="0"/>
-              <a:t>other data store, </a:t>
-            </a:r>
-            <a:r>
-              <a:rPr lang="en-US" sz="2300" dirty="0" smtClean="0"/>
-              <a:t>crunches the numbers and does the ‘heavy lifting’ in your application.</a:t>
-            </a:r>
           </a:p>
           <a:p>
             <a:endParaRPr lang="en-US" sz="2300" dirty="0"/>
@@ -2620,17 +2635,28 @@
             </a:endParaRPr>
           </a:p>
           <a:p>
+            <a:pPr marL="0" indent="0">
+              <a:buNone/>
+            </a:pPr>
             <a:r>
               <a:rPr lang="en-US" sz="2300" dirty="0" smtClean="0"/>
-              <a:t>It kicks off various functionalities within your application based on the input it receives. Acquiring necessary information from the </a:t>
+              <a:t>	</a:t>
+            </a:r>
+            <a:r>
+              <a:rPr lang="en-US" sz="2300" dirty="0"/>
+              <a:t>K</a:t>
             </a:r>
             <a:r>
               <a:rPr lang="en-US" sz="2300" dirty="0" smtClean="0"/>
-              <a:t>model, and </a:t>
+              <a:t>icks off various functionalities within your application based on the 	input it receives. Acquiring necessary information from the </a:t>
             </a:r>
             <a:r>
               <a:rPr lang="en-US" sz="2300" dirty="0" smtClean="0"/>
-              <a:t>passing </a:t>
+              <a:t>model, </a:t>
+            </a:r>
+            <a:r>
+              <a:rPr lang="en-US" sz="2300" dirty="0" smtClean="0"/>
+              <a:t>	and passing </a:t>
             </a:r>
             <a:r>
               <a:rPr lang="en-US" sz="2300" dirty="0" smtClean="0"/>
@@ -8335,11 +8361,7 @@
             </a:pPr>
             <a:r>
               <a:rPr lang="en-US" sz="3200" dirty="0" smtClean="0"/>
-              <a:t>Greatly increases the modularity and reusability of your </a:t>
-            </a:r>
-            <a:r>
-              <a:rPr lang="en-US" sz="3200" smtClean="0"/>
-              <a:t>code base.</a:t>
+              <a:t>Greatly increases the modularity and reusability of your code base.</a:t>
             </a:r>
             <a:endParaRPr lang="en-US" sz="3200" dirty="0"/>
           </a:p>
@@ -8437,184 +8459,14 @@
       </p:sp>
       <p:sp>
         <p:nvSpPr>
-          <p:cNvPr id="4" name="Rectangle 3"/>
-          <p:cNvSpPr/>
-          <p:nvPr/>
-        </p:nvSpPr>
-        <p:spPr>
-          <a:xfrm>
-            <a:off x="512064" y="2723877"/>
-            <a:ext cx="2150017" cy="3058909"/>
-          </a:xfrm>
-          <a:prstGeom prst="rect">
-            <a:avLst/>
-          </a:prstGeom>
-          <a:solidFill>
-            <a:srgbClr val="00A9B9"/>
-          </a:solidFill>
-          <a:ln>
-            <a:noFill/>
-          </a:ln>
-          <a:effectLst/>
-        </p:spPr>
-        <p:style>
-          <a:lnRef idx="1">
-            <a:schemeClr val="accent1"/>
-          </a:lnRef>
-          <a:fillRef idx="3">
-            <a:schemeClr val="accent1"/>
-          </a:fillRef>
-          <a:effectRef idx="2">
-            <a:schemeClr val="accent1"/>
-          </a:effectRef>
-          <a:fontRef idx="minor">
-            <a:schemeClr val="lt1"/>
-          </a:fontRef>
-        </p:style>
-        <p:txBody>
-          <a:bodyPr rtlCol="0" anchor="t"/>
-          <a:lstStyle/>
-          <a:p>
-            <a:endParaRPr lang="en-US" sz="2200" dirty="0">
-              <a:solidFill>
-                <a:schemeClr val="accent1"/>
-              </a:solidFill>
-            </a:endParaRPr>
-          </a:p>
-          <a:p>
-            <a:pPr marL="111125"/>
-            <a:endParaRPr lang="en-US" sz="2200" dirty="0" smtClean="0">
-              <a:solidFill>
-                <a:schemeClr val="accent1"/>
-              </a:solidFill>
-            </a:endParaRPr>
-          </a:p>
-        </p:txBody>
-      </p:sp>
-      <p:sp>
-        <p:nvSpPr>
-          <p:cNvPr id="5" name="Rectangle 4"/>
-          <p:cNvSpPr/>
-          <p:nvPr/>
-        </p:nvSpPr>
-        <p:spPr>
-          <a:xfrm>
-            <a:off x="3493911" y="2668662"/>
-            <a:ext cx="2150017" cy="3058909"/>
-          </a:xfrm>
-          <a:prstGeom prst="rect">
-            <a:avLst/>
-          </a:prstGeom>
-          <a:solidFill>
-            <a:srgbClr val="EA4A3C"/>
-          </a:solidFill>
-          <a:ln>
-            <a:noFill/>
-          </a:ln>
-          <a:effectLst/>
-        </p:spPr>
-        <p:style>
-          <a:lnRef idx="1">
-            <a:schemeClr val="accent1"/>
-          </a:lnRef>
-          <a:fillRef idx="3">
-            <a:schemeClr val="accent1"/>
-          </a:fillRef>
-          <a:effectRef idx="2">
-            <a:schemeClr val="accent1"/>
-          </a:effectRef>
-          <a:fontRef idx="minor">
-            <a:schemeClr val="lt1"/>
-          </a:fontRef>
-        </p:style>
-        <p:txBody>
-          <a:bodyPr rtlCol="0" anchor="t"/>
-          <a:lstStyle/>
-          <a:p>
-            <a:pPr marL="111125"/>
-            <a:endParaRPr lang="en-US" sz="2200" dirty="0" smtClean="0">
-              <a:solidFill>
-                <a:srgbClr val="F8F8F8"/>
-              </a:solidFill>
-            </a:endParaRPr>
-          </a:p>
-          <a:p>
-            <a:pPr marL="111125"/>
-            <a:endParaRPr lang="en-US" sz="2200" dirty="0" smtClean="0">
-              <a:solidFill>
-                <a:srgbClr val="F8F8F8"/>
-              </a:solidFill>
-            </a:endParaRPr>
-          </a:p>
-        </p:txBody>
-      </p:sp>
-      <p:sp>
-        <p:nvSpPr>
-          <p:cNvPr id="6" name="Rectangle 5"/>
-          <p:cNvSpPr/>
-          <p:nvPr/>
-        </p:nvSpPr>
-        <p:spPr>
-          <a:xfrm>
-            <a:off x="6536783" y="2723877"/>
-            <a:ext cx="2150017" cy="3058909"/>
-          </a:xfrm>
-          <a:prstGeom prst="rect">
-            <a:avLst/>
-          </a:prstGeom>
-          <a:solidFill>
-            <a:schemeClr val="accent6"/>
-          </a:solidFill>
-          <a:ln>
-            <a:noFill/>
-          </a:ln>
-          <a:effectLst/>
-        </p:spPr>
-        <p:style>
-          <a:lnRef idx="1">
-            <a:schemeClr val="accent1"/>
-          </a:lnRef>
-          <a:fillRef idx="3">
-            <a:schemeClr val="accent1"/>
-          </a:fillRef>
-          <a:effectRef idx="2">
-            <a:schemeClr val="accent1"/>
-          </a:effectRef>
-          <a:fontRef idx="minor">
-            <a:schemeClr val="lt1"/>
-          </a:fontRef>
-        </p:style>
-        <p:txBody>
-          <a:bodyPr rtlCol="0" anchor="t"/>
-          <a:lstStyle/>
-          <a:p>
-            <a:pPr marL="111125"/>
-            <a:endParaRPr lang="en-US" sz="2200" dirty="0" smtClean="0">
-              <a:solidFill>
-                <a:srgbClr val="F8F8F8"/>
-              </a:solidFill>
-            </a:endParaRPr>
-          </a:p>
-          <a:p>
-            <a:pPr marL="111125"/>
-            <a:endParaRPr lang="en-US" sz="2200" dirty="0" smtClean="0">
-              <a:solidFill>
-                <a:srgbClr val="F8F8F8"/>
-              </a:solidFill>
-            </a:endParaRPr>
-          </a:p>
-        </p:txBody>
-      </p:sp>
-      <p:sp>
-        <p:nvSpPr>
-          <p:cNvPr id="8" name="TextBox 7"/>
+          <p:cNvPr id="7" name="TextBox 6"/>
           <p:cNvSpPr txBox="1"/>
           <p:nvPr/>
         </p:nvSpPr>
         <p:spPr>
           <a:xfrm>
-            <a:off x="457200" y="1865376"/>
-            <a:ext cx="2204881" cy="584776"/>
+            <a:off x="131396" y="1876429"/>
+            <a:ext cx="8802110" cy="1569660"/>
           </a:xfrm>
           <a:prstGeom prst="rect">
             <a:avLst/>
@@ -8630,137 +8482,30 @@
             <a:pPr algn="ctr"/>
             <a:r>
               <a:rPr lang="en-US" sz="3200" dirty="0" smtClean="0"/>
-              <a:t>Model</a:t>
+              <a:t>What does the </a:t>
+            </a:r>
+          </a:p>
+          <a:p>
+            <a:pPr algn="ctr"/>
+            <a:r>
+              <a:rPr lang="en-US" sz="3200" dirty="0" smtClean="0"/>
+              <a:t>Single Responsibility Message Pattern</a:t>
+            </a:r>
+          </a:p>
+          <a:p>
+            <a:pPr algn="ctr"/>
+            <a:r>
+              <a:rPr lang="en-US" sz="3200" dirty="0" smtClean="0"/>
+              <a:t> look like in MVC?</a:t>
             </a:r>
             <a:endParaRPr lang="en-US" sz="3200" dirty="0"/>
-          </a:p>
-        </p:txBody>
-      </p:sp>
-      <p:sp>
-        <p:nvSpPr>
-          <p:cNvPr id="10" name="TextBox 9"/>
-          <p:cNvSpPr txBox="1"/>
-          <p:nvPr/>
-        </p:nvSpPr>
-        <p:spPr>
-          <a:xfrm>
-            <a:off x="3493911" y="1865376"/>
-            <a:ext cx="2204881" cy="584776"/>
-          </a:xfrm>
-          <a:prstGeom prst="rect">
-            <a:avLst/>
-          </a:prstGeom>
-          <a:noFill/>
-        </p:spPr>
-        <p:txBody>
-          <a:bodyPr wrap="square" rtlCol="0">
-            <a:spAutoFit/>
-          </a:bodyPr>
-          <a:lstStyle/>
-          <a:p>
-            <a:pPr algn="ctr"/>
-            <a:r>
-              <a:rPr lang="en-US" sz="3200" dirty="0" smtClean="0"/>
-              <a:t>Controller</a:t>
-            </a:r>
-            <a:endParaRPr lang="en-US" sz="3200" dirty="0"/>
-          </a:p>
-        </p:txBody>
-      </p:sp>
-      <p:sp>
-        <p:nvSpPr>
-          <p:cNvPr id="11" name="TextBox 10"/>
-          <p:cNvSpPr txBox="1"/>
-          <p:nvPr/>
-        </p:nvSpPr>
-        <p:spPr>
-          <a:xfrm>
-            <a:off x="6536783" y="1865376"/>
-            <a:ext cx="2204881" cy="584776"/>
-          </a:xfrm>
-          <a:prstGeom prst="rect">
-            <a:avLst/>
-          </a:prstGeom>
-          <a:noFill/>
-        </p:spPr>
-        <p:txBody>
-          <a:bodyPr wrap="square" rtlCol="0">
-            <a:spAutoFit/>
-          </a:bodyPr>
-          <a:lstStyle/>
-          <a:p>
-            <a:pPr algn="ctr"/>
-            <a:r>
-              <a:rPr lang="en-US" sz="3200" dirty="0" smtClean="0"/>
-              <a:t>View</a:t>
-            </a:r>
-            <a:endParaRPr lang="en-US" sz="3200" dirty="0"/>
-          </a:p>
-        </p:txBody>
-      </p:sp>
-      <p:sp>
-        <p:nvSpPr>
-          <p:cNvPr id="27" name="Rectangle 26"/>
-          <p:cNvSpPr/>
-          <p:nvPr/>
-        </p:nvSpPr>
-        <p:spPr>
-          <a:xfrm>
-            <a:off x="3699937" y="2858661"/>
-            <a:ext cx="1730320" cy="396667"/>
-          </a:xfrm>
-          <a:prstGeom prst="rect">
-            <a:avLst/>
-          </a:prstGeom>
-          <a:solidFill>
-            <a:schemeClr val="accent4"/>
-          </a:solidFill>
-          <a:ln w="28575" cmpd="sng">
-            <a:solidFill>
-              <a:schemeClr val="accent1"/>
-            </a:solidFill>
-          </a:ln>
-          <a:effectLst/>
-        </p:spPr>
-        <p:style>
-          <a:lnRef idx="1">
-            <a:schemeClr val="accent1"/>
-          </a:lnRef>
-          <a:fillRef idx="3">
-            <a:schemeClr val="accent1"/>
-          </a:fillRef>
-          <a:effectRef idx="2">
-            <a:schemeClr val="accent1"/>
-          </a:effectRef>
-          <a:fontRef idx="minor">
-            <a:schemeClr val="lt1"/>
-          </a:fontRef>
-        </p:style>
-        <p:txBody>
-          <a:bodyPr rtlCol="0" anchor="ctr"/>
-          <a:lstStyle/>
-          <a:p>
-            <a:pPr algn="ctr"/>
-            <a:r>
-              <a:rPr lang="en-US" dirty="0" smtClean="0">
-                <a:solidFill>
-                  <a:srgbClr val="F8F8F8"/>
-                </a:solidFill>
-              </a:rPr>
-              <a:t>Initiate Program</a:t>
-            </a:r>
-            <a:endParaRPr lang="en-US" dirty="0">
-              <a:solidFill>
-                <a:srgbClr val="F8F8F8"/>
-              </a:solidFill>
-            </a:endParaRPr>
           </a:p>
         </p:txBody>
       </p:sp>
     </p:spTree>
     <p:extLst>
       <p:ext uri="{BB962C8B-B14F-4D97-AF65-F5344CB8AC3E}">
-        <p14:creationId xmlns:p14="http://schemas.microsoft.com/office/powerpoint/2010/main" val="3774287812"/>
+        <p14:creationId xmlns:p14="http://schemas.microsoft.com/office/powerpoint/2010/main" val="2909969707"/>
       </p:ext>
     </p:extLst>
   </p:cSld>
@@ -9110,111 +8855,6 @@
           </a:p>
         </p:txBody>
       </p:sp>
-      <p:cxnSp>
-        <p:nvCxnSpPr>
-          <p:cNvPr id="24" name="Straight Arrow Connector 23"/>
-          <p:cNvCxnSpPr/>
-          <p:nvPr/>
-        </p:nvCxnSpPr>
-        <p:spPr>
-          <a:xfrm>
-            <a:off x="5430257" y="3056995"/>
-            <a:ext cx="1325350" cy="0"/>
-          </a:xfrm>
-          <a:prstGeom prst="straightConnector1">
-            <a:avLst/>
-          </a:prstGeom>
-          <a:ln w="57150" cmpd="sng">
-            <a:solidFill>
-              <a:schemeClr val="accent2"/>
-            </a:solidFill>
-            <a:headEnd type="none"/>
-            <a:tailEnd type="triangle"/>
-          </a:ln>
-          <a:effectLst/>
-        </p:spPr>
-        <p:style>
-          <a:lnRef idx="2">
-            <a:schemeClr val="accent1"/>
-          </a:lnRef>
-          <a:fillRef idx="0">
-            <a:schemeClr val="accent1"/>
-          </a:fillRef>
-          <a:effectRef idx="1">
-            <a:schemeClr val="accent1"/>
-          </a:effectRef>
-          <a:fontRef idx="minor">
-            <a:schemeClr val="tx1"/>
-          </a:fontRef>
-        </p:style>
-      </p:cxnSp>
-      <p:sp>
-        <p:nvSpPr>
-          <p:cNvPr id="25" name="Rectangle 24"/>
-          <p:cNvSpPr/>
-          <p:nvPr/>
-        </p:nvSpPr>
-        <p:spPr>
-          <a:xfrm>
-            <a:off x="6755607" y="2858661"/>
-            <a:ext cx="1730320" cy="396667"/>
-          </a:xfrm>
-          <a:prstGeom prst="rect">
-            <a:avLst/>
-          </a:prstGeom>
-          <a:solidFill>
-            <a:schemeClr val="accent6"/>
-          </a:solidFill>
-          <a:ln w="28575" cmpd="sng">
-            <a:solidFill>
-              <a:schemeClr val="accent1"/>
-            </a:solidFill>
-          </a:ln>
-          <a:effectLst/>
-        </p:spPr>
-        <p:style>
-          <a:lnRef idx="1">
-            <a:schemeClr val="accent1"/>
-          </a:lnRef>
-          <a:fillRef idx="3">
-            <a:schemeClr val="accent1"/>
-          </a:fillRef>
-          <a:effectRef idx="2">
-            <a:schemeClr val="accent1"/>
-          </a:effectRef>
-          <a:fontRef idx="minor">
-            <a:schemeClr val="lt1"/>
-          </a:fontRef>
-        </p:style>
-        <p:txBody>
-          <a:bodyPr rtlCol="0" anchor="ctr"/>
-          <a:lstStyle/>
-          <a:p>
-            <a:pPr algn="ctr"/>
-            <a:r>
-              <a:rPr lang="en-US" dirty="0">
-                <a:solidFill>
-                  <a:srgbClr val="F8F8F8"/>
-                </a:solidFill>
-              </a:rPr>
-              <a:t>p</a:t>
-            </a:r>
-            <a:r>
-              <a:rPr lang="en-US" dirty="0" smtClean="0">
-                <a:solidFill>
-                  <a:srgbClr val="F8F8F8"/>
-                </a:solidFill>
-              </a:rPr>
-              <a:t>rompt user</a:t>
-            </a:r>
-            <a:endParaRPr lang="en-US" dirty="0">
-              <a:solidFill>
-                <a:srgbClr val="F8F8F8"/>
-              </a:solidFill>
-            </a:endParaRPr>
-          </a:p>
-        </p:txBody>
-      </p:sp>
       <p:sp>
         <p:nvSpPr>
           <p:cNvPr id="27" name="Rectangle 26"/>
@@ -9274,77 +8914,10 @@
           </a:p>
         </p:txBody>
       </p:sp>
-      <p:sp>
-        <p:nvSpPr>
-          <p:cNvPr id="35" name="Rectangle 34"/>
-          <p:cNvSpPr/>
-          <p:nvPr/>
-        </p:nvSpPr>
-        <p:spPr>
-          <a:xfrm>
-            <a:off x="702737" y="2862107"/>
-            <a:ext cx="1730320" cy="396667"/>
-          </a:xfrm>
-          <a:prstGeom prst="rect">
-            <a:avLst/>
-          </a:prstGeom>
-          <a:solidFill>
-            <a:schemeClr val="accent5"/>
-          </a:solidFill>
-          <a:ln w="28575" cmpd="sng">
-            <a:solidFill>
-              <a:schemeClr val="accent1"/>
-            </a:solidFill>
-          </a:ln>
-          <a:effectLst/>
-        </p:spPr>
-        <p:style>
-          <a:lnRef idx="1">
-            <a:schemeClr val="accent1"/>
-          </a:lnRef>
-          <a:fillRef idx="3">
-            <a:schemeClr val="accent1"/>
-          </a:fillRef>
-          <a:effectRef idx="2">
-            <a:schemeClr val="accent1"/>
-          </a:effectRef>
-          <a:fontRef idx="minor">
-            <a:schemeClr val="lt1"/>
-          </a:fontRef>
-        </p:style>
-        <p:txBody>
-          <a:bodyPr rtlCol="0" anchor="ctr"/>
-          <a:lstStyle/>
-          <a:p>
-            <a:pPr algn="ctr"/>
-            <a:r>
-              <a:rPr lang="en-US" dirty="0">
-                <a:solidFill>
-                  <a:srgbClr val="F8F8F8"/>
-                </a:solidFill>
-              </a:rPr>
-              <a:t>i</a:t>
-            </a:r>
-            <a:r>
-              <a:rPr lang="en-US" dirty="0" smtClean="0">
-                <a:solidFill>
-                  <a:srgbClr val="F8F8F8"/>
-                </a:solidFill>
-              </a:rPr>
-              <a:t>nitiate data </a:t>
-            </a:r>
-            <a:endParaRPr lang="en-US" dirty="0">
-              <a:solidFill>
-                <a:srgbClr val="F8F8F8"/>
-              </a:solidFill>
-            </a:endParaRPr>
-          </a:p>
-        </p:txBody>
-      </p:sp>
     </p:spTree>
     <p:extLst>
       <p:ext uri="{BB962C8B-B14F-4D97-AF65-F5344CB8AC3E}">
-        <p14:creationId xmlns:p14="http://schemas.microsoft.com/office/powerpoint/2010/main" val="3440086341"/>
+        <p14:creationId xmlns:p14="http://schemas.microsoft.com/office/powerpoint/2010/main" val="3774287812"/>
       </p:ext>
     </p:extLst>
   </p:cSld>
@@ -9811,15 +9384,53 @@
           </a:p>
         </p:txBody>
       </p:sp>
-      <p:sp>
-        <p:nvSpPr>
-          <p:cNvPr id="7" name="Rectangle 6"/>
+      <p:cxnSp>
+        <p:nvCxnSpPr>
+          <p:cNvPr id="24" name="Straight Arrow Connector 23"/>
+          <p:cNvCxnSpPr/>
+          <p:nvPr/>
+        </p:nvCxnSpPr>
+        <p:spPr>
+          <a:xfrm>
+            <a:off x="5430257" y="3056995"/>
+            <a:ext cx="1325350" cy="0"/>
+          </a:xfrm>
+          <a:prstGeom prst="straightConnector1">
+            <a:avLst/>
+          </a:prstGeom>
+          <a:ln w="57150" cmpd="sng">
+            <a:solidFill>
+              <a:schemeClr val="accent2"/>
+            </a:solidFill>
+            <a:headEnd type="none"/>
+            <a:tailEnd type="triangle"/>
+          </a:ln>
+          <a:effectLst/>
+        </p:spPr>
+        <p:style>
+          <a:lnRef idx="2">
+            <a:schemeClr val="accent1"/>
+          </a:lnRef>
+          <a:fillRef idx="0">
+            <a:schemeClr val="accent1"/>
+          </a:fillRef>
+          <a:effectRef idx="1">
+            <a:schemeClr val="accent1"/>
+          </a:effectRef>
+          <a:fontRef idx="minor">
+            <a:schemeClr val="tx1"/>
+          </a:fontRef>
+        </p:style>
+      </p:cxnSp>
+      <p:sp>
+        <p:nvSpPr>
+          <p:cNvPr id="25" name="Rectangle 24"/>
           <p:cNvSpPr/>
           <p:nvPr/>
         </p:nvSpPr>
         <p:spPr>
           <a:xfrm>
-            <a:off x="6755607" y="3533858"/>
+            <a:off x="6755607" y="2858661"/>
             <a:ext cx="1730320" cy="396667"/>
           </a:xfrm>
           <a:prstGeom prst="rect">
@@ -9855,141 +9466,6 @@
           <a:p>
             <a:pPr algn="ctr"/>
             <a:r>
-              <a:rPr lang="en-US" dirty="0" smtClean="0">
-                <a:solidFill>
-                  <a:srgbClr val="F8F8F8"/>
-                </a:solidFill>
-              </a:rPr>
-              <a:t>send input</a:t>
-            </a:r>
-            <a:endParaRPr lang="en-US" dirty="0">
-              <a:solidFill>
-                <a:srgbClr val="F8F8F8"/>
-              </a:solidFill>
-            </a:endParaRPr>
-          </a:p>
-        </p:txBody>
-      </p:sp>
-      <p:cxnSp>
-        <p:nvCxnSpPr>
-          <p:cNvPr id="24" name="Straight Arrow Connector 23"/>
-          <p:cNvCxnSpPr/>
-          <p:nvPr/>
-        </p:nvCxnSpPr>
-        <p:spPr>
-          <a:xfrm>
-            <a:off x="5430257" y="3056995"/>
-            <a:ext cx="1325350" cy="0"/>
-          </a:xfrm>
-          <a:prstGeom prst="straightConnector1">
-            <a:avLst/>
-          </a:prstGeom>
-          <a:ln w="57150" cmpd="sng">
-            <a:solidFill>
-              <a:schemeClr val="accent2"/>
-            </a:solidFill>
-            <a:headEnd type="none"/>
-            <a:tailEnd type="triangle"/>
-          </a:ln>
-          <a:effectLst/>
-        </p:spPr>
-        <p:style>
-          <a:lnRef idx="2">
-            <a:schemeClr val="accent1"/>
-          </a:lnRef>
-          <a:fillRef idx="0">
-            <a:schemeClr val="accent1"/>
-          </a:fillRef>
-          <a:effectRef idx="1">
-            <a:schemeClr val="accent1"/>
-          </a:effectRef>
-          <a:fontRef idx="minor">
-            <a:schemeClr val="tx1"/>
-          </a:fontRef>
-        </p:style>
-      </p:cxnSp>
-      <p:cxnSp>
-        <p:nvCxnSpPr>
-          <p:cNvPr id="26" name="Straight Arrow Connector 25"/>
-          <p:cNvCxnSpPr/>
-          <p:nvPr/>
-        </p:nvCxnSpPr>
-        <p:spPr>
-          <a:xfrm>
-            <a:off x="7619091" y="2941410"/>
-            <a:ext cx="0" cy="614240"/>
-          </a:xfrm>
-          <a:prstGeom prst="straightConnector1">
-            <a:avLst/>
-          </a:prstGeom>
-          <a:ln w="57150" cmpd="sng">
-            <a:solidFill>
-              <a:schemeClr val="accent2"/>
-            </a:solidFill>
-            <a:headEnd type="none"/>
-            <a:tailEnd type="triangle"/>
-          </a:ln>
-          <a:effectLst/>
-        </p:spPr>
-        <p:style>
-          <a:lnRef idx="2">
-            <a:schemeClr val="accent1"/>
-          </a:lnRef>
-          <a:fillRef idx="0">
-            <a:schemeClr val="accent1"/>
-          </a:fillRef>
-          <a:effectRef idx="1">
-            <a:schemeClr val="accent1"/>
-          </a:effectRef>
-          <a:fontRef idx="minor">
-            <a:schemeClr val="tx1"/>
-          </a:fontRef>
-        </p:style>
-      </p:cxnSp>
-      <p:sp>
-        <p:nvSpPr>
-          <p:cNvPr id="25" name="Rectangle 24"/>
-          <p:cNvSpPr/>
-          <p:nvPr/>
-        </p:nvSpPr>
-        <p:spPr>
-          <a:xfrm>
-            <a:off x="6755607" y="2858661"/>
-            <a:ext cx="1730320" cy="396667"/>
-          </a:xfrm>
-          <a:prstGeom prst="rect">
-            <a:avLst/>
-          </a:prstGeom>
-          <a:solidFill>
-            <a:schemeClr val="accent6"/>
-          </a:solidFill>
-          <a:ln w="28575" cmpd="sng">
-            <a:solidFill>
-              <a:schemeClr val="accent1"/>
-            </a:solidFill>
-          </a:ln>
-          <a:effectLst/>
-        </p:spPr>
-        <p:style>
-          <a:lnRef idx="1">
-            <a:schemeClr val="accent1"/>
-          </a:lnRef>
-          <a:fillRef idx="3">
-            <a:schemeClr val="accent1"/>
-          </a:fillRef>
-          <a:effectRef idx="2">
-            <a:schemeClr val="accent1"/>
-          </a:effectRef>
-          <a:fontRef idx="minor">
-            <a:schemeClr val="lt1"/>
-          </a:fontRef>
-        </p:style>
-        <p:txBody>
-          <a:bodyPr rtlCol="0" anchor="ctr"/>
-          <a:lstStyle/>
-          <a:p>
-            <a:pPr algn="ctr"/>
-            <a:r>
               <a:rPr lang="en-US" dirty="0">
                 <a:solidFill>
                   <a:srgbClr val="F8F8F8"/>
@@ -10142,7 +9618,7 @@
     </p:spTree>
     <p:extLst>
       <p:ext uri="{BB962C8B-B14F-4D97-AF65-F5344CB8AC3E}">
-        <p14:creationId xmlns:p14="http://schemas.microsoft.com/office/powerpoint/2010/main" val="1766437960"/>
+        <p14:creationId xmlns:p14="http://schemas.microsoft.com/office/powerpoint/2010/main" val="3440086341"/>
       </p:ext>
     </p:extLst>
   </p:cSld>
@@ -10492,46 +9968,6 @@
           </a:p>
         </p:txBody>
       </p:sp>
-      <p:cxnSp>
-        <p:nvCxnSpPr>
-          <p:cNvPr id="12" name="Straight Arrow Connector 11"/>
-          <p:cNvCxnSpPr>
-            <a:stCxn id="7" idx="1"/>
-          </p:cNvCxnSpPr>
-          <p:nvPr/>
-        </p:nvCxnSpPr>
-        <p:spPr>
-          <a:xfrm flipH="1">
-            <a:off x="5537200" y="3732192"/>
-            <a:ext cx="1218407" cy="0"/>
-          </a:xfrm>
-          <a:prstGeom prst="straightConnector1">
-            <a:avLst/>
-          </a:prstGeom>
-          <a:ln w="57150" cmpd="sng">
-            <a:solidFill>
-              <a:schemeClr val="accent2"/>
-            </a:solidFill>
-            <a:headEnd type="none"/>
-            <a:tailEnd type="triangle"/>
-          </a:ln>
-          <a:effectLst/>
-        </p:spPr>
-        <p:style>
-          <a:lnRef idx="2">
-            <a:schemeClr val="accent1"/>
-          </a:lnRef>
-          <a:fillRef idx="0">
-            <a:schemeClr val="accent1"/>
-          </a:fillRef>
-          <a:effectRef idx="1">
-            <a:schemeClr val="accent1"/>
-          </a:effectRef>
-          <a:fontRef idx="minor">
-            <a:schemeClr val="tx1"/>
-          </a:fontRef>
-        </p:style>
-      </p:cxnSp>
       <p:sp>
         <p:nvSpPr>
           <p:cNvPr id="7" name="Rectangle 6"/>
@@ -10582,65 +10018,6 @@
                 </a:solidFill>
               </a:rPr>
               <a:t>send input</a:t>
-            </a:r>
-            <a:endParaRPr lang="en-US" dirty="0">
-              <a:solidFill>
-                <a:srgbClr val="F8F8F8"/>
-              </a:solidFill>
-            </a:endParaRPr>
-          </a:p>
-        </p:txBody>
-      </p:sp>
-      <p:sp>
-        <p:nvSpPr>
-          <p:cNvPr id="13" name="Rectangle 12"/>
-          <p:cNvSpPr/>
-          <p:nvPr/>
-        </p:nvSpPr>
-        <p:spPr>
-          <a:xfrm>
-            <a:off x="3699937" y="3533858"/>
-            <a:ext cx="1730320" cy="396667"/>
-          </a:xfrm>
-          <a:prstGeom prst="rect">
-            <a:avLst/>
-          </a:prstGeom>
-          <a:solidFill>
-            <a:schemeClr val="accent4"/>
-          </a:solidFill>
-          <a:ln w="28575" cmpd="sng">
-            <a:solidFill>
-              <a:schemeClr val="accent1"/>
-            </a:solidFill>
-          </a:ln>
-          <a:effectLst/>
-        </p:spPr>
-        <p:style>
-          <a:lnRef idx="1">
-            <a:schemeClr val="accent1"/>
-          </a:lnRef>
-          <a:fillRef idx="3">
-            <a:schemeClr val="accent1"/>
-          </a:fillRef>
-          <a:effectRef idx="2">
-            <a:schemeClr val="accent1"/>
-          </a:effectRef>
-          <a:fontRef idx="minor">
-            <a:schemeClr val="lt1"/>
-          </a:fontRef>
-        </p:style>
-        <p:txBody>
-          <a:bodyPr rtlCol="0" anchor="ctr"/>
-          <a:lstStyle/>
-          <a:p>
-            <a:pPr algn="ctr"/>
-            <a:r>
-              <a:rPr lang="en-US" dirty="0" smtClean="0">
-                <a:solidFill>
-                  <a:srgbClr val="F8F8F8"/>
-                </a:solidFill>
-              </a:rPr>
-              <a:t>interpret input</a:t>
             </a:r>
             <a:endParaRPr lang="en-US" dirty="0">
               <a:solidFill>
@@ -10922,7 +10299,7 @@
     </p:spTree>
     <p:extLst>
       <p:ext uri="{BB962C8B-B14F-4D97-AF65-F5344CB8AC3E}">
-        <p14:creationId xmlns:p14="http://schemas.microsoft.com/office/powerpoint/2010/main" val="4268115242"/>
+        <p14:creationId xmlns:p14="http://schemas.microsoft.com/office/powerpoint/2010/main" val="1766437960"/>
       </p:ext>
     </p:extLst>
   </p:cSld>
@@ -11371,44 +10748,6 @@
           </a:p>
         </p:txBody>
       </p:sp>
-      <p:cxnSp>
-        <p:nvCxnSpPr>
-          <p:cNvPr id="15" name="Straight Arrow Connector 14"/>
-          <p:cNvCxnSpPr/>
-          <p:nvPr/>
-        </p:nvCxnSpPr>
-        <p:spPr>
-          <a:xfrm>
-            <a:off x="4565097" y="3673683"/>
-            <a:ext cx="0" cy="614240"/>
-          </a:xfrm>
-          <a:prstGeom prst="straightConnector1">
-            <a:avLst/>
-          </a:prstGeom>
-          <a:ln w="57150" cmpd="sng">
-            <a:solidFill>
-              <a:schemeClr val="accent2"/>
-            </a:solidFill>
-            <a:headEnd type="none"/>
-            <a:tailEnd type="triangle"/>
-          </a:ln>
-          <a:effectLst/>
-        </p:spPr>
-        <p:style>
-          <a:lnRef idx="2">
-            <a:schemeClr val="accent1"/>
-          </a:lnRef>
-          <a:fillRef idx="0">
-            <a:schemeClr val="accent1"/>
-          </a:fillRef>
-          <a:effectRef idx="1">
-            <a:schemeClr val="accent1"/>
-          </a:effectRef>
-          <a:fontRef idx="minor">
-            <a:schemeClr val="tx1"/>
-          </a:fontRef>
-        </p:style>
-      </p:cxnSp>
       <p:sp>
         <p:nvSpPr>
           <p:cNvPr id="13" name="Rectangle 12"/>
@@ -11459,65 +10798,6 @@
                 </a:solidFill>
               </a:rPr>
               <a:t>interpret input</a:t>
-            </a:r>
-            <a:endParaRPr lang="en-US" dirty="0">
-              <a:solidFill>
-                <a:srgbClr val="F8F8F8"/>
-              </a:solidFill>
-            </a:endParaRPr>
-          </a:p>
-        </p:txBody>
-      </p:sp>
-      <p:sp>
-        <p:nvSpPr>
-          <p:cNvPr id="14" name="Rectangle 13"/>
-          <p:cNvSpPr/>
-          <p:nvPr/>
-        </p:nvSpPr>
-        <p:spPr>
-          <a:xfrm>
-            <a:off x="3699937" y="4285338"/>
-            <a:ext cx="1730320" cy="396667"/>
-          </a:xfrm>
-          <a:prstGeom prst="rect">
-            <a:avLst/>
-          </a:prstGeom>
-          <a:solidFill>
-            <a:schemeClr val="accent4"/>
-          </a:solidFill>
-          <a:ln w="28575" cmpd="sng">
-            <a:solidFill>
-              <a:schemeClr val="accent1"/>
-            </a:solidFill>
-          </a:ln>
-          <a:effectLst/>
-        </p:spPr>
-        <p:style>
-          <a:lnRef idx="1">
-            <a:schemeClr val="accent1"/>
-          </a:lnRef>
-          <a:fillRef idx="3">
-            <a:schemeClr val="accent1"/>
-          </a:fillRef>
-          <a:effectRef idx="2">
-            <a:schemeClr val="accent1"/>
-          </a:effectRef>
-          <a:fontRef idx="minor">
-            <a:schemeClr val="lt1"/>
-          </a:fontRef>
-        </p:style>
-        <p:txBody>
-          <a:bodyPr rtlCol="0" anchor="ctr"/>
-          <a:lstStyle/>
-          <a:p>
-            <a:pPr algn="ctr"/>
-            <a:r>
-              <a:rPr lang="en-US" dirty="0" smtClean="0">
-                <a:solidFill>
-                  <a:srgbClr val="F8F8F8"/>
-                </a:solidFill>
-              </a:rPr>
-              <a:t>request data</a:t>
             </a:r>
             <a:endParaRPr lang="en-US" dirty="0">
               <a:solidFill>
@@ -11799,7 +11079,7 @@
     </p:spTree>
     <p:extLst>
       <p:ext uri="{BB962C8B-B14F-4D97-AF65-F5344CB8AC3E}">
-        <p14:creationId xmlns:p14="http://schemas.microsoft.com/office/powerpoint/2010/main" val="1228894101"/>
+        <p14:creationId xmlns:p14="http://schemas.microsoft.com/office/powerpoint/2010/main" val="4268115242"/>
       </p:ext>
     </p:extLst>
   </p:cSld>
@@ -12345,44 +11625,6 @@
           </a:p>
         </p:txBody>
       </p:sp>
-      <p:cxnSp>
-        <p:nvCxnSpPr>
-          <p:cNvPr id="17" name="Straight Arrow Connector 16"/>
-          <p:cNvCxnSpPr/>
-          <p:nvPr/>
-        </p:nvCxnSpPr>
-        <p:spPr>
-          <a:xfrm flipH="1">
-            <a:off x="2445133" y="4494636"/>
-            <a:ext cx="1218407" cy="0"/>
-          </a:xfrm>
-          <a:prstGeom prst="straightConnector1">
-            <a:avLst/>
-          </a:prstGeom>
-          <a:ln w="57150" cmpd="sng">
-            <a:solidFill>
-              <a:schemeClr val="accent2"/>
-            </a:solidFill>
-            <a:headEnd type="none"/>
-            <a:tailEnd type="triangle"/>
-          </a:ln>
-          <a:effectLst/>
-        </p:spPr>
-        <p:style>
-          <a:lnRef idx="2">
-            <a:schemeClr val="accent1"/>
-          </a:lnRef>
-          <a:fillRef idx="0">
-            <a:schemeClr val="accent1"/>
-          </a:fillRef>
-          <a:effectRef idx="1">
-            <a:schemeClr val="accent1"/>
-          </a:effectRef>
-          <a:fontRef idx="minor">
-            <a:schemeClr val="tx1"/>
-          </a:fontRef>
-        </p:style>
-      </p:cxnSp>
       <p:sp>
         <p:nvSpPr>
           <p:cNvPr id="14" name="Rectangle 13"/>
@@ -12433,65 +11675,6 @@
                 </a:solidFill>
               </a:rPr>
               <a:t>request data</a:t>
-            </a:r>
-            <a:endParaRPr lang="en-US" dirty="0">
-              <a:solidFill>
-                <a:srgbClr val="F8F8F8"/>
-              </a:solidFill>
-            </a:endParaRPr>
-          </a:p>
-        </p:txBody>
-      </p:sp>
-      <p:sp>
-        <p:nvSpPr>
-          <p:cNvPr id="16" name="Rectangle 15"/>
-          <p:cNvSpPr/>
-          <p:nvPr/>
-        </p:nvSpPr>
-        <p:spPr>
-          <a:xfrm>
-            <a:off x="702737" y="4285338"/>
-            <a:ext cx="1730320" cy="396667"/>
-          </a:xfrm>
-          <a:prstGeom prst="rect">
-            <a:avLst/>
-          </a:prstGeom>
-          <a:solidFill>
-            <a:schemeClr val="accent5"/>
-          </a:solidFill>
-          <a:ln w="28575" cmpd="sng">
-            <a:solidFill>
-              <a:schemeClr val="accent1"/>
-            </a:solidFill>
-          </a:ln>
-          <a:effectLst/>
-        </p:spPr>
-        <p:style>
-          <a:lnRef idx="1">
-            <a:schemeClr val="accent1"/>
-          </a:lnRef>
-          <a:fillRef idx="3">
-            <a:schemeClr val="accent1"/>
-          </a:fillRef>
-          <a:effectRef idx="2">
-            <a:schemeClr val="accent1"/>
-          </a:effectRef>
-          <a:fontRef idx="minor">
-            <a:schemeClr val="lt1"/>
-          </a:fontRef>
-        </p:style>
-        <p:txBody>
-          <a:bodyPr rtlCol="0" anchor="ctr"/>
-          <a:lstStyle/>
-          <a:p>
-            <a:pPr algn="ctr"/>
-            <a:r>
-              <a:rPr lang="en-US" dirty="0" smtClean="0">
-                <a:solidFill>
-                  <a:srgbClr val="F8F8F8"/>
-                </a:solidFill>
-              </a:rPr>
-              <a:t>gather data</a:t>
             </a:r>
             <a:endParaRPr lang="en-US" dirty="0">
               <a:solidFill>
@@ -12773,7 +11956,7 @@
     </p:spTree>
     <p:extLst>
       <p:ext uri="{BB962C8B-B14F-4D97-AF65-F5344CB8AC3E}">
-        <p14:creationId xmlns:p14="http://schemas.microsoft.com/office/powerpoint/2010/main" val="1911309529"/>
+        <p14:creationId xmlns:p14="http://schemas.microsoft.com/office/powerpoint/2010/main" val="1228894101"/>
       </p:ext>
     </p:extLst>
   </p:cSld>
@@ -13416,44 +12599,6 @@
           </a:p>
         </p:txBody>
       </p:sp>
-      <p:cxnSp>
-        <p:nvCxnSpPr>
-          <p:cNvPr id="19" name="Straight Arrow Connector 18"/>
-          <p:cNvCxnSpPr/>
-          <p:nvPr/>
-        </p:nvCxnSpPr>
-        <p:spPr>
-          <a:xfrm>
-            <a:off x="1567897" y="4410894"/>
-            <a:ext cx="0" cy="614240"/>
-          </a:xfrm>
-          <a:prstGeom prst="straightConnector1">
-            <a:avLst/>
-          </a:prstGeom>
-          <a:ln w="57150" cmpd="sng">
-            <a:solidFill>
-              <a:schemeClr val="accent2"/>
-            </a:solidFill>
-            <a:headEnd type="none"/>
-            <a:tailEnd type="triangle"/>
-          </a:ln>
-          <a:effectLst/>
-        </p:spPr>
-        <p:style>
-          <a:lnRef idx="2">
-            <a:schemeClr val="accent1"/>
-          </a:lnRef>
-          <a:fillRef idx="0">
-            <a:schemeClr val="accent1"/>
-          </a:fillRef>
-          <a:effectRef idx="1">
-            <a:schemeClr val="accent1"/>
-          </a:effectRef>
-          <a:fontRef idx="minor">
-            <a:schemeClr val="tx1"/>
-          </a:fontRef>
-        </p:style>
-      </p:cxnSp>
       <p:sp>
         <p:nvSpPr>
           <p:cNvPr id="16" name="Rectangle 15"/>
@@ -13504,65 +12649,6 @@
                 </a:solidFill>
               </a:rPr>
               <a:t>gather data</a:t>
-            </a:r>
-            <a:endParaRPr lang="en-US" dirty="0">
-              <a:solidFill>
-                <a:srgbClr val="F8F8F8"/>
-              </a:solidFill>
-            </a:endParaRPr>
-          </a:p>
-        </p:txBody>
-      </p:sp>
-      <p:sp>
-        <p:nvSpPr>
-          <p:cNvPr id="18" name="Rectangle 17"/>
-          <p:cNvSpPr/>
-          <p:nvPr/>
-        </p:nvSpPr>
-        <p:spPr>
-          <a:xfrm>
-            <a:off x="702737" y="5093893"/>
-            <a:ext cx="1730320" cy="396667"/>
-          </a:xfrm>
-          <a:prstGeom prst="rect">
-            <a:avLst/>
-          </a:prstGeom>
-          <a:solidFill>
-            <a:schemeClr val="accent5"/>
-          </a:solidFill>
-          <a:ln w="28575" cmpd="sng">
-            <a:solidFill>
-              <a:schemeClr val="accent1"/>
-            </a:solidFill>
-          </a:ln>
-          <a:effectLst/>
-        </p:spPr>
-        <p:style>
-          <a:lnRef idx="1">
-            <a:schemeClr val="accent1"/>
-          </a:lnRef>
-          <a:fillRef idx="3">
-            <a:schemeClr val="accent1"/>
-          </a:fillRef>
-          <a:effectRef idx="2">
-            <a:schemeClr val="accent1"/>
-          </a:effectRef>
-          <a:fontRef idx="minor">
-            <a:schemeClr val="lt1"/>
-          </a:fontRef>
-        </p:style>
-        <p:txBody>
-          <a:bodyPr rtlCol="0" anchor="ctr"/>
-          <a:lstStyle/>
-          <a:p>
-            <a:pPr algn="ctr"/>
-            <a:r>
-              <a:rPr lang="en-US" dirty="0" smtClean="0">
-                <a:solidFill>
-                  <a:srgbClr val="F8F8F8"/>
-                </a:solidFill>
-              </a:rPr>
-              <a:t>return data</a:t>
             </a:r>
             <a:endParaRPr lang="en-US" dirty="0">
               <a:solidFill>
@@ -13844,7 +12930,7 @@
     </p:spTree>
     <p:extLst>
       <p:ext uri="{BB962C8B-B14F-4D97-AF65-F5344CB8AC3E}">
-        <p14:creationId xmlns:p14="http://schemas.microsoft.com/office/powerpoint/2010/main" val="2161236216"/>
+        <p14:creationId xmlns:p14="http://schemas.microsoft.com/office/powerpoint/2010/main" val="1911309529"/>
       </p:ext>
     </p:extLst>
   </p:cSld>
@@ -14584,44 +13670,6 @@
           </a:p>
         </p:txBody>
       </p:sp>
-      <p:cxnSp>
-        <p:nvCxnSpPr>
-          <p:cNvPr id="21" name="Straight Arrow Connector 20"/>
-          <p:cNvCxnSpPr/>
-          <p:nvPr/>
-        </p:nvCxnSpPr>
-        <p:spPr>
-          <a:xfrm>
-            <a:off x="2382257" y="5300588"/>
-            <a:ext cx="1218407" cy="0"/>
-          </a:xfrm>
-          <a:prstGeom prst="straightConnector1">
-            <a:avLst/>
-          </a:prstGeom>
-          <a:ln w="57150" cmpd="sng">
-            <a:solidFill>
-              <a:schemeClr val="accent2"/>
-            </a:solidFill>
-            <a:headEnd type="none"/>
-            <a:tailEnd type="triangle"/>
-          </a:ln>
-          <a:effectLst/>
-        </p:spPr>
-        <p:style>
-          <a:lnRef idx="2">
-            <a:schemeClr val="accent1"/>
-          </a:lnRef>
-          <a:fillRef idx="0">
-            <a:schemeClr val="accent1"/>
-          </a:fillRef>
-          <a:effectRef idx="1">
-            <a:schemeClr val="accent1"/>
-          </a:effectRef>
-          <a:fontRef idx="minor">
-            <a:schemeClr val="tx1"/>
-          </a:fontRef>
-        </p:style>
-      </p:cxnSp>
       <p:sp>
         <p:nvSpPr>
           <p:cNvPr id="18" name="Rectangle 17"/>
@@ -14672,65 +13720,6 @@
                 </a:solidFill>
               </a:rPr>
               <a:t>return data</a:t>
-            </a:r>
-            <a:endParaRPr lang="en-US" dirty="0">
-              <a:solidFill>
-                <a:srgbClr val="F8F8F8"/>
-              </a:solidFill>
-            </a:endParaRPr>
-          </a:p>
-        </p:txBody>
-      </p:sp>
-      <p:sp>
-        <p:nvSpPr>
-          <p:cNvPr id="20" name="Rectangle 19"/>
-          <p:cNvSpPr/>
-          <p:nvPr/>
-        </p:nvSpPr>
-        <p:spPr>
-          <a:xfrm>
-            <a:off x="3699937" y="5093893"/>
-            <a:ext cx="1730320" cy="396667"/>
-          </a:xfrm>
-          <a:prstGeom prst="rect">
-            <a:avLst/>
-          </a:prstGeom>
-          <a:solidFill>
-            <a:schemeClr val="accent4"/>
-          </a:solidFill>
-          <a:ln w="28575" cmpd="sng">
-            <a:solidFill>
-              <a:schemeClr val="accent1"/>
-            </a:solidFill>
-          </a:ln>
-          <a:effectLst/>
-        </p:spPr>
-        <p:style>
-          <a:lnRef idx="1">
-            <a:schemeClr val="accent1"/>
-          </a:lnRef>
-          <a:fillRef idx="3">
-            <a:schemeClr val="accent1"/>
-          </a:fillRef>
-          <a:effectRef idx="2">
-            <a:schemeClr val="accent1"/>
-          </a:effectRef>
-          <a:fontRef idx="minor">
-            <a:schemeClr val="lt1"/>
-          </a:fontRef>
-        </p:style>
-        <p:txBody>
-          <a:bodyPr rtlCol="0" anchor="ctr"/>
-          <a:lstStyle/>
-          <a:p>
-            <a:pPr algn="ctr"/>
-            <a:r>
-              <a:rPr lang="en-US" dirty="0" smtClean="0">
-                <a:solidFill>
-                  <a:srgbClr val="F8F8F8"/>
-                </a:solidFill>
-              </a:rPr>
-              <a:t>forward data</a:t>
             </a:r>
             <a:endParaRPr lang="en-US" dirty="0">
               <a:solidFill>
@@ -15012,7 +14001,7 @@
     </p:spTree>
     <p:extLst>
       <p:ext uri="{BB962C8B-B14F-4D97-AF65-F5344CB8AC3E}">
-        <p14:creationId xmlns:p14="http://schemas.microsoft.com/office/powerpoint/2010/main" val="4197247014"/>
+        <p14:creationId xmlns:p14="http://schemas.microsoft.com/office/powerpoint/2010/main" val="2161236216"/>
       </p:ext>
     </p:extLst>
   </p:cSld>
@@ -15851,103 +14840,6 @@
       </p:sp>
       <p:sp>
         <p:nvSpPr>
-          <p:cNvPr id="22" name="Rectangle 21"/>
-          <p:cNvSpPr/>
-          <p:nvPr/>
-        </p:nvSpPr>
-        <p:spPr>
-          <a:xfrm>
-            <a:off x="6755607" y="5102254"/>
-            <a:ext cx="1730320" cy="396667"/>
-          </a:xfrm>
-          <a:prstGeom prst="rect">
-            <a:avLst/>
-          </a:prstGeom>
-          <a:solidFill>
-            <a:schemeClr val="accent6"/>
-          </a:solidFill>
-          <a:ln w="28575" cmpd="sng">
-            <a:solidFill>
-              <a:schemeClr val="accent1"/>
-            </a:solidFill>
-          </a:ln>
-          <a:effectLst/>
-        </p:spPr>
-        <p:style>
-          <a:lnRef idx="1">
-            <a:schemeClr val="accent1"/>
-          </a:lnRef>
-          <a:fillRef idx="3">
-            <a:schemeClr val="accent1"/>
-          </a:fillRef>
-          <a:effectRef idx="2">
-            <a:schemeClr val="accent1"/>
-          </a:effectRef>
-          <a:fontRef idx="minor">
-            <a:schemeClr val="lt1"/>
-          </a:fontRef>
-        </p:style>
-        <p:txBody>
-          <a:bodyPr rtlCol="0" anchor="ctr"/>
-          <a:lstStyle/>
-          <a:p>
-            <a:pPr algn="ctr"/>
-            <a:r>
-              <a:rPr lang="en-US" dirty="0" smtClean="0">
-                <a:solidFill>
-                  <a:srgbClr val="F8F8F8"/>
-                </a:solidFill>
-              </a:rPr>
-              <a:t>display data</a:t>
-            </a:r>
-            <a:endParaRPr lang="en-US" dirty="0">
-              <a:solidFill>
-                <a:srgbClr val="F8F8F8"/>
-              </a:solidFill>
-            </a:endParaRPr>
-          </a:p>
-        </p:txBody>
-      </p:sp>
-      <p:cxnSp>
-        <p:nvCxnSpPr>
-          <p:cNvPr id="23" name="Straight Arrow Connector 22"/>
-          <p:cNvCxnSpPr/>
-          <p:nvPr/>
-        </p:nvCxnSpPr>
-        <p:spPr>
-          <a:xfrm>
-            <a:off x="5430257" y="5300588"/>
-            <a:ext cx="1218407" cy="0"/>
-          </a:xfrm>
-          <a:prstGeom prst="straightConnector1">
-            <a:avLst/>
-          </a:prstGeom>
-          <a:ln w="57150" cmpd="sng">
-            <a:solidFill>
-              <a:schemeClr val="accent2"/>
-            </a:solidFill>
-            <a:headEnd type="none"/>
-            <a:tailEnd type="triangle"/>
-          </a:ln>
-          <a:effectLst/>
-        </p:spPr>
-        <p:style>
-          <a:lnRef idx="2">
-            <a:schemeClr val="accent1"/>
-          </a:lnRef>
-          <a:fillRef idx="0">
-            <a:schemeClr val="accent1"/>
-          </a:fillRef>
-          <a:effectRef idx="1">
-            <a:schemeClr val="accent1"/>
-          </a:effectRef>
-          <a:fontRef idx="minor">
-            <a:schemeClr val="tx1"/>
-          </a:fontRef>
-        </p:style>
-      </p:cxnSp>
-      <p:sp>
-        <p:nvSpPr>
           <p:cNvPr id="20" name="Rectangle 19"/>
           <p:cNvSpPr/>
           <p:nvPr/>
@@ -16277,7 +15169,7 @@
     </p:spTree>
     <p:extLst>
       <p:ext uri="{BB962C8B-B14F-4D97-AF65-F5344CB8AC3E}">
-        <p14:creationId xmlns:p14="http://schemas.microsoft.com/office/powerpoint/2010/main" val="1743989980"/>
+        <p14:creationId xmlns:p14="http://schemas.microsoft.com/office/powerpoint/2010/main" val="4197247014"/>
       </p:ext>
     </p:extLst>
   </p:cSld>
@@ -16329,6 +15221,1271 @@
         </p:spPr>
         <p:txBody>
           <a:bodyPr>
+            <a:normAutofit/>
+          </a:bodyPr>
+          <a:lstStyle/>
+          <a:p>
+            <a:r>
+              <a:rPr lang="en-US" dirty="0" smtClean="0"/>
+              <a:t>TODO’s: List</a:t>
+            </a:r>
+            <a:endParaRPr lang="en-US" dirty="0"/>
+          </a:p>
+        </p:txBody>
+      </p:sp>
+      <p:sp>
+        <p:nvSpPr>
+          <p:cNvPr id="3" name="Footer Placeholder 2"/>
+          <p:cNvSpPr>
+            <a:spLocks noGrp="1"/>
+          </p:cNvSpPr>
+          <p:nvPr>
+            <p:ph type="ftr" sz="quarter" idx="3"/>
+          </p:nvPr>
+        </p:nvSpPr>
+        <p:spPr/>
+        <p:txBody>
+          <a:bodyPr/>
+          <a:lstStyle/>
+          <a:p>
+            <a:r>
+              <a:rPr lang="en-US" smtClean="0"/>
+              <a:t>Model – View – Controller: A Design Pattern</a:t>
+            </a:r>
+            <a:endParaRPr lang="en-US" dirty="0"/>
+          </a:p>
+        </p:txBody>
+      </p:sp>
+      <p:sp>
+        <p:nvSpPr>
+          <p:cNvPr id="4" name="Rectangle 3"/>
+          <p:cNvSpPr/>
+          <p:nvPr/>
+        </p:nvSpPr>
+        <p:spPr>
+          <a:xfrm>
+            <a:off x="512064" y="2723877"/>
+            <a:ext cx="2150017" cy="3058909"/>
+          </a:xfrm>
+          <a:prstGeom prst="rect">
+            <a:avLst/>
+          </a:prstGeom>
+          <a:solidFill>
+            <a:srgbClr val="00A9B9"/>
+          </a:solidFill>
+          <a:ln>
+            <a:noFill/>
+          </a:ln>
+          <a:effectLst/>
+        </p:spPr>
+        <p:style>
+          <a:lnRef idx="1">
+            <a:schemeClr val="accent1"/>
+          </a:lnRef>
+          <a:fillRef idx="3">
+            <a:schemeClr val="accent1"/>
+          </a:fillRef>
+          <a:effectRef idx="2">
+            <a:schemeClr val="accent1"/>
+          </a:effectRef>
+          <a:fontRef idx="minor">
+            <a:schemeClr val="lt1"/>
+          </a:fontRef>
+        </p:style>
+        <p:txBody>
+          <a:bodyPr rtlCol="0" anchor="t"/>
+          <a:lstStyle/>
+          <a:p>
+            <a:endParaRPr lang="en-US" sz="2200" dirty="0">
+              <a:solidFill>
+                <a:schemeClr val="accent1"/>
+              </a:solidFill>
+            </a:endParaRPr>
+          </a:p>
+          <a:p>
+            <a:pPr marL="111125"/>
+            <a:endParaRPr lang="en-US" sz="2200" dirty="0" smtClean="0">
+              <a:solidFill>
+                <a:schemeClr val="accent1"/>
+              </a:solidFill>
+            </a:endParaRPr>
+          </a:p>
+        </p:txBody>
+      </p:sp>
+      <p:sp>
+        <p:nvSpPr>
+          <p:cNvPr id="5" name="Rectangle 4"/>
+          <p:cNvSpPr/>
+          <p:nvPr/>
+        </p:nvSpPr>
+        <p:spPr>
+          <a:xfrm>
+            <a:off x="3493911" y="2668662"/>
+            <a:ext cx="2150017" cy="3058909"/>
+          </a:xfrm>
+          <a:prstGeom prst="rect">
+            <a:avLst/>
+          </a:prstGeom>
+          <a:solidFill>
+            <a:srgbClr val="EA4A3C"/>
+          </a:solidFill>
+          <a:ln>
+            <a:noFill/>
+          </a:ln>
+          <a:effectLst/>
+        </p:spPr>
+        <p:style>
+          <a:lnRef idx="1">
+            <a:schemeClr val="accent1"/>
+          </a:lnRef>
+          <a:fillRef idx="3">
+            <a:schemeClr val="accent1"/>
+          </a:fillRef>
+          <a:effectRef idx="2">
+            <a:schemeClr val="accent1"/>
+          </a:effectRef>
+          <a:fontRef idx="minor">
+            <a:schemeClr val="lt1"/>
+          </a:fontRef>
+        </p:style>
+        <p:txBody>
+          <a:bodyPr rtlCol="0" anchor="t"/>
+          <a:lstStyle/>
+          <a:p>
+            <a:pPr marL="111125"/>
+            <a:endParaRPr lang="en-US" sz="2200" dirty="0" smtClean="0">
+              <a:solidFill>
+                <a:srgbClr val="F8F8F8"/>
+              </a:solidFill>
+            </a:endParaRPr>
+          </a:p>
+          <a:p>
+            <a:pPr marL="111125"/>
+            <a:endParaRPr lang="en-US" sz="2200" dirty="0" smtClean="0">
+              <a:solidFill>
+                <a:srgbClr val="F8F8F8"/>
+              </a:solidFill>
+            </a:endParaRPr>
+          </a:p>
+        </p:txBody>
+      </p:sp>
+      <p:sp>
+        <p:nvSpPr>
+          <p:cNvPr id="6" name="Rectangle 5"/>
+          <p:cNvSpPr/>
+          <p:nvPr/>
+        </p:nvSpPr>
+        <p:spPr>
+          <a:xfrm>
+            <a:off x="6536783" y="2723877"/>
+            <a:ext cx="2150017" cy="3058909"/>
+          </a:xfrm>
+          <a:prstGeom prst="rect">
+            <a:avLst/>
+          </a:prstGeom>
+          <a:solidFill>
+            <a:schemeClr val="accent6"/>
+          </a:solidFill>
+          <a:ln>
+            <a:noFill/>
+          </a:ln>
+          <a:effectLst/>
+        </p:spPr>
+        <p:style>
+          <a:lnRef idx="1">
+            <a:schemeClr val="accent1"/>
+          </a:lnRef>
+          <a:fillRef idx="3">
+            <a:schemeClr val="accent1"/>
+          </a:fillRef>
+          <a:effectRef idx="2">
+            <a:schemeClr val="accent1"/>
+          </a:effectRef>
+          <a:fontRef idx="minor">
+            <a:schemeClr val="lt1"/>
+          </a:fontRef>
+        </p:style>
+        <p:txBody>
+          <a:bodyPr rtlCol="0" anchor="t"/>
+          <a:lstStyle/>
+          <a:p>
+            <a:pPr marL="111125"/>
+            <a:endParaRPr lang="en-US" sz="2200" dirty="0" smtClean="0">
+              <a:solidFill>
+                <a:srgbClr val="F8F8F8"/>
+              </a:solidFill>
+            </a:endParaRPr>
+          </a:p>
+          <a:p>
+            <a:pPr marL="111125"/>
+            <a:endParaRPr lang="en-US" sz="2200" dirty="0" smtClean="0">
+              <a:solidFill>
+                <a:srgbClr val="F8F8F8"/>
+              </a:solidFill>
+            </a:endParaRPr>
+          </a:p>
+        </p:txBody>
+      </p:sp>
+      <p:sp>
+        <p:nvSpPr>
+          <p:cNvPr id="8" name="TextBox 7"/>
+          <p:cNvSpPr txBox="1"/>
+          <p:nvPr/>
+        </p:nvSpPr>
+        <p:spPr>
+          <a:xfrm>
+            <a:off x="457200" y="1865376"/>
+            <a:ext cx="2204881" cy="584776"/>
+          </a:xfrm>
+          <a:prstGeom prst="rect">
+            <a:avLst/>
+          </a:prstGeom>
+          <a:noFill/>
+        </p:spPr>
+        <p:txBody>
+          <a:bodyPr wrap="square" rtlCol="0">
+            <a:spAutoFit/>
+          </a:bodyPr>
+          <a:lstStyle/>
+          <a:p>
+            <a:pPr algn="ctr"/>
+            <a:r>
+              <a:rPr lang="en-US" sz="3200" dirty="0" smtClean="0"/>
+              <a:t>Model</a:t>
+            </a:r>
+            <a:endParaRPr lang="en-US" sz="3200" dirty="0"/>
+          </a:p>
+        </p:txBody>
+      </p:sp>
+      <p:sp>
+        <p:nvSpPr>
+          <p:cNvPr id="10" name="TextBox 9"/>
+          <p:cNvSpPr txBox="1"/>
+          <p:nvPr/>
+        </p:nvSpPr>
+        <p:spPr>
+          <a:xfrm>
+            <a:off x="3493911" y="1865376"/>
+            <a:ext cx="2204881" cy="584776"/>
+          </a:xfrm>
+          <a:prstGeom prst="rect">
+            <a:avLst/>
+          </a:prstGeom>
+          <a:noFill/>
+        </p:spPr>
+        <p:txBody>
+          <a:bodyPr wrap="square" rtlCol="0">
+            <a:spAutoFit/>
+          </a:bodyPr>
+          <a:lstStyle/>
+          <a:p>
+            <a:pPr algn="ctr"/>
+            <a:r>
+              <a:rPr lang="en-US" sz="3200" dirty="0" smtClean="0"/>
+              <a:t>Controller</a:t>
+            </a:r>
+            <a:endParaRPr lang="en-US" sz="3200" dirty="0"/>
+          </a:p>
+        </p:txBody>
+      </p:sp>
+      <p:sp>
+        <p:nvSpPr>
+          <p:cNvPr id="11" name="TextBox 10"/>
+          <p:cNvSpPr txBox="1"/>
+          <p:nvPr/>
+        </p:nvSpPr>
+        <p:spPr>
+          <a:xfrm>
+            <a:off x="6536783" y="1865376"/>
+            <a:ext cx="2204881" cy="584776"/>
+          </a:xfrm>
+          <a:prstGeom prst="rect">
+            <a:avLst/>
+          </a:prstGeom>
+          <a:noFill/>
+        </p:spPr>
+        <p:txBody>
+          <a:bodyPr wrap="square" rtlCol="0">
+            <a:spAutoFit/>
+          </a:bodyPr>
+          <a:lstStyle/>
+          <a:p>
+            <a:pPr algn="ctr"/>
+            <a:r>
+              <a:rPr lang="en-US" sz="3200" dirty="0" smtClean="0"/>
+              <a:t>View</a:t>
+            </a:r>
+            <a:endParaRPr lang="en-US" sz="3200" dirty="0"/>
+          </a:p>
+        </p:txBody>
+      </p:sp>
+      <p:cxnSp>
+        <p:nvCxnSpPr>
+          <p:cNvPr id="12" name="Straight Arrow Connector 11"/>
+          <p:cNvCxnSpPr>
+            <a:stCxn id="7" idx="1"/>
+          </p:cNvCxnSpPr>
+          <p:nvPr/>
+        </p:nvCxnSpPr>
+        <p:spPr>
+          <a:xfrm flipH="1">
+            <a:off x="5537200" y="3732192"/>
+            <a:ext cx="1218407" cy="0"/>
+          </a:xfrm>
+          <a:prstGeom prst="straightConnector1">
+            <a:avLst/>
+          </a:prstGeom>
+          <a:ln w="57150" cmpd="sng">
+            <a:solidFill>
+              <a:schemeClr val="accent2"/>
+            </a:solidFill>
+            <a:headEnd type="none"/>
+            <a:tailEnd type="triangle"/>
+          </a:ln>
+          <a:effectLst/>
+        </p:spPr>
+        <p:style>
+          <a:lnRef idx="2">
+            <a:schemeClr val="accent1"/>
+          </a:lnRef>
+          <a:fillRef idx="0">
+            <a:schemeClr val="accent1"/>
+          </a:fillRef>
+          <a:effectRef idx="1">
+            <a:schemeClr val="accent1"/>
+          </a:effectRef>
+          <a:fontRef idx="minor">
+            <a:schemeClr val="tx1"/>
+          </a:fontRef>
+        </p:style>
+      </p:cxnSp>
+      <p:sp>
+        <p:nvSpPr>
+          <p:cNvPr id="7" name="Rectangle 6"/>
+          <p:cNvSpPr/>
+          <p:nvPr/>
+        </p:nvSpPr>
+        <p:spPr>
+          <a:xfrm>
+            <a:off x="6755607" y="3533858"/>
+            <a:ext cx="1730320" cy="396667"/>
+          </a:xfrm>
+          <a:prstGeom prst="rect">
+            <a:avLst/>
+          </a:prstGeom>
+          <a:solidFill>
+            <a:schemeClr val="accent6"/>
+          </a:solidFill>
+          <a:ln w="28575" cmpd="sng">
+            <a:solidFill>
+              <a:schemeClr val="accent1"/>
+            </a:solidFill>
+          </a:ln>
+          <a:effectLst/>
+        </p:spPr>
+        <p:style>
+          <a:lnRef idx="1">
+            <a:schemeClr val="accent1"/>
+          </a:lnRef>
+          <a:fillRef idx="3">
+            <a:schemeClr val="accent1"/>
+          </a:fillRef>
+          <a:effectRef idx="2">
+            <a:schemeClr val="accent1"/>
+          </a:effectRef>
+          <a:fontRef idx="minor">
+            <a:schemeClr val="lt1"/>
+          </a:fontRef>
+        </p:style>
+        <p:txBody>
+          <a:bodyPr rtlCol="0" anchor="ctr"/>
+          <a:lstStyle/>
+          <a:p>
+            <a:pPr algn="ctr"/>
+            <a:r>
+              <a:rPr lang="en-US" dirty="0" smtClean="0">
+                <a:solidFill>
+                  <a:srgbClr val="F8F8F8"/>
+                </a:solidFill>
+              </a:rPr>
+              <a:t>send input</a:t>
+            </a:r>
+            <a:endParaRPr lang="en-US" dirty="0">
+              <a:solidFill>
+                <a:srgbClr val="F8F8F8"/>
+              </a:solidFill>
+            </a:endParaRPr>
+          </a:p>
+        </p:txBody>
+      </p:sp>
+      <p:cxnSp>
+        <p:nvCxnSpPr>
+          <p:cNvPr id="15" name="Straight Arrow Connector 14"/>
+          <p:cNvCxnSpPr/>
+          <p:nvPr/>
+        </p:nvCxnSpPr>
+        <p:spPr>
+          <a:xfrm>
+            <a:off x="4565097" y="3673683"/>
+            <a:ext cx="0" cy="614240"/>
+          </a:xfrm>
+          <a:prstGeom prst="straightConnector1">
+            <a:avLst/>
+          </a:prstGeom>
+          <a:ln w="57150" cmpd="sng">
+            <a:solidFill>
+              <a:schemeClr val="accent2"/>
+            </a:solidFill>
+            <a:headEnd type="none"/>
+            <a:tailEnd type="triangle"/>
+          </a:ln>
+          <a:effectLst/>
+        </p:spPr>
+        <p:style>
+          <a:lnRef idx="2">
+            <a:schemeClr val="accent1"/>
+          </a:lnRef>
+          <a:fillRef idx="0">
+            <a:schemeClr val="accent1"/>
+          </a:fillRef>
+          <a:effectRef idx="1">
+            <a:schemeClr val="accent1"/>
+          </a:effectRef>
+          <a:fontRef idx="minor">
+            <a:schemeClr val="tx1"/>
+          </a:fontRef>
+        </p:style>
+      </p:cxnSp>
+      <p:sp>
+        <p:nvSpPr>
+          <p:cNvPr id="13" name="Rectangle 12"/>
+          <p:cNvSpPr/>
+          <p:nvPr/>
+        </p:nvSpPr>
+        <p:spPr>
+          <a:xfrm>
+            <a:off x="3699937" y="3533858"/>
+            <a:ext cx="1730320" cy="396667"/>
+          </a:xfrm>
+          <a:prstGeom prst="rect">
+            <a:avLst/>
+          </a:prstGeom>
+          <a:solidFill>
+            <a:schemeClr val="accent4"/>
+          </a:solidFill>
+          <a:ln w="28575" cmpd="sng">
+            <a:solidFill>
+              <a:schemeClr val="accent1"/>
+            </a:solidFill>
+          </a:ln>
+          <a:effectLst/>
+        </p:spPr>
+        <p:style>
+          <a:lnRef idx="1">
+            <a:schemeClr val="accent1"/>
+          </a:lnRef>
+          <a:fillRef idx="3">
+            <a:schemeClr val="accent1"/>
+          </a:fillRef>
+          <a:effectRef idx="2">
+            <a:schemeClr val="accent1"/>
+          </a:effectRef>
+          <a:fontRef idx="minor">
+            <a:schemeClr val="lt1"/>
+          </a:fontRef>
+        </p:style>
+        <p:txBody>
+          <a:bodyPr rtlCol="0" anchor="ctr"/>
+          <a:lstStyle/>
+          <a:p>
+            <a:pPr algn="ctr"/>
+            <a:r>
+              <a:rPr lang="en-US" dirty="0" smtClean="0">
+                <a:solidFill>
+                  <a:srgbClr val="F8F8F8"/>
+                </a:solidFill>
+              </a:rPr>
+              <a:t>interpret input</a:t>
+            </a:r>
+            <a:endParaRPr lang="en-US" dirty="0">
+              <a:solidFill>
+                <a:srgbClr val="F8F8F8"/>
+              </a:solidFill>
+            </a:endParaRPr>
+          </a:p>
+        </p:txBody>
+      </p:sp>
+      <p:cxnSp>
+        <p:nvCxnSpPr>
+          <p:cNvPr id="17" name="Straight Arrow Connector 16"/>
+          <p:cNvCxnSpPr/>
+          <p:nvPr/>
+        </p:nvCxnSpPr>
+        <p:spPr>
+          <a:xfrm flipH="1">
+            <a:off x="2445133" y="4494636"/>
+            <a:ext cx="1218407" cy="0"/>
+          </a:xfrm>
+          <a:prstGeom prst="straightConnector1">
+            <a:avLst/>
+          </a:prstGeom>
+          <a:ln w="57150" cmpd="sng">
+            <a:solidFill>
+              <a:schemeClr val="accent2"/>
+            </a:solidFill>
+            <a:headEnd type="none"/>
+            <a:tailEnd type="triangle"/>
+          </a:ln>
+          <a:effectLst/>
+        </p:spPr>
+        <p:style>
+          <a:lnRef idx="2">
+            <a:schemeClr val="accent1"/>
+          </a:lnRef>
+          <a:fillRef idx="0">
+            <a:schemeClr val="accent1"/>
+          </a:fillRef>
+          <a:effectRef idx="1">
+            <a:schemeClr val="accent1"/>
+          </a:effectRef>
+          <a:fontRef idx="minor">
+            <a:schemeClr val="tx1"/>
+          </a:fontRef>
+        </p:style>
+      </p:cxnSp>
+      <p:sp>
+        <p:nvSpPr>
+          <p:cNvPr id="14" name="Rectangle 13"/>
+          <p:cNvSpPr/>
+          <p:nvPr/>
+        </p:nvSpPr>
+        <p:spPr>
+          <a:xfrm>
+            <a:off x="3699937" y="4285338"/>
+            <a:ext cx="1730320" cy="396667"/>
+          </a:xfrm>
+          <a:prstGeom prst="rect">
+            <a:avLst/>
+          </a:prstGeom>
+          <a:solidFill>
+            <a:schemeClr val="accent4"/>
+          </a:solidFill>
+          <a:ln w="28575" cmpd="sng">
+            <a:solidFill>
+              <a:schemeClr val="accent1"/>
+            </a:solidFill>
+          </a:ln>
+          <a:effectLst/>
+        </p:spPr>
+        <p:style>
+          <a:lnRef idx="1">
+            <a:schemeClr val="accent1"/>
+          </a:lnRef>
+          <a:fillRef idx="3">
+            <a:schemeClr val="accent1"/>
+          </a:fillRef>
+          <a:effectRef idx="2">
+            <a:schemeClr val="accent1"/>
+          </a:effectRef>
+          <a:fontRef idx="minor">
+            <a:schemeClr val="lt1"/>
+          </a:fontRef>
+        </p:style>
+        <p:txBody>
+          <a:bodyPr rtlCol="0" anchor="ctr"/>
+          <a:lstStyle/>
+          <a:p>
+            <a:pPr algn="ctr"/>
+            <a:r>
+              <a:rPr lang="en-US" dirty="0" smtClean="0">
+                <a:solidFill>
+                  <a:srgbClr val="F8F8F8"/>
+                </a:solidFill>
+              </a:rPr>
+              <a:t>request data</a:t>
+            </a:r>
+            <a:endParaRPr lang="en-US" dirty="0">
+              <a:solidFill>
+                <a:srgbClr val="F8F8F8"/>
+              </a:solidFill>
+            </a:endParaRPr>
+          </a:p>
+        </p:txBody>
+      </p:sp>
+      <p:cxnSp>
+        <p:nvCxnSpPr>
+          <p:cNvPr id="19" name="Straight Arrow Connector 18"/>
+          <p:cNvCxnSpPr/>
+          <p:nvPr/>
+        </p:nvCxnSpPr>
+        <p:spPr>
+          <a:xfrm>
+            <a:off x="1567897" y="4410894"/>
+            <a:ext cx="0" cy="614240"/>
+          </a:xfrm>
+          <a:prstGeom prst="straightConnector1">
+            <a:avLst/>
+          </a:prstGeom>
+          <a:ln w="57150" cmpd="sng">
+            <a:solidFill>
+              <a:schemeClr val="accent2"/>
+            </a:solidFill>
+            <a:headEnd type="none"/>
+            <a:tailEnd type="triangle"/>
+          </a:ln>
+          <a:effectLst/>
+        </p:spPr>
+        <p:style>
+          <a:lnRef idx="2">
+            <a:schemeClr val="accent1"/>
+          </a:lnRef>
+          <a:fillRef idx="0">
+            <a:schemeClr val="accent1"/>
+          </a:fillRef>
+          <a:effectRef idx="1">
+            <a:schemeClr val="accent1"/>
+          </a:effectRef>
+          <a:fontRef idx="minor">
+            <a:schemeClr val="tx1"/>
+          </a:fontRef>
+        </p:style>
+      </p:cxnSp>
+      <p:sp>
+        <p:nvSpPr>
+          <p:cNvPr id="16" name="Rectangle 15"/>
+          <p:cNvSpPr/>
+          <p:nvPr/>
+        </p:nvSpPr>
+        <p:spPr>
+          <a:xfrm>
+            <a:off x="702737" y="4285338"/>
+            <a:ext cx="1730320" cy="396667"/>
+          </a:xfrm>
+          <a:prstGeom prst="rect">
+            <a:avLst/>
+          </a:prstGeom>
+          <a:solidFill>
+            <a:schemeClr val="accent5"/>
+          </a:solidFill>
+          <a:ln w="28575" cmpd="sng">
+            <a:solidFill>
+              <a:schemeClr val="accent1"/>
+            </a:solidFill>
+          </a:ln>
+          <a:effectLst/>
+        </p:spPr>
+        <p:style>
+          <a:lnRef idx="1">
+            <a:schemeClr val="accent1"/>
+          </a:lnRef>
+          <a:fillRef idx="3">
+            <a:schemeClr val="accent1"/>
+          </a:fillRef>
+          <a:effectRef idx="2">
+            <a:schemeClr val="accent1"/>
+          </a:effectRef>
+          <a:fontRef idx="minor">
+            <a:schemeClr val="lt1"/>
+          </a:fontRef>
+        </p:style>
+        <p:txBody>
+          <a:bodyPr rtlCol="0" anchor="ctr"/>
+          <a:lstStyle/>
+          <a:p>
+            <a:pPr algn="ctr"/>
+            <a:r>
+              <a:rPr lang="en-US" dirty="0" smtClean="0">
+                <a:solidFill>
+                  <a:srgbClr val="F8F8F8"/>
+                </a:solidFill>
+              </a:rPr>
+              <a:t>gather data</a:t>
+            </a:r>
+            <a:endParaRPr lang="en-US" dirty="0">
+              <a:solidFill>
+                <a:srgbClr val="F8F8F8"/>
+              </a:solidFill>
+            </a:endParaRPr>
+          </a:p>
+        </p:txBody>
+      </p:sp>
+      <p:cxnSp>
+        <p:nvCxnSpPr>
+          <p:cNvPr id="21" name="Straight Arrow Connector 20"/>
+          <p:cNvCxnSpPr/>
+          <p:nvPr/>
+        </p:nvCxnSpPr>
+        <p:spPr>
+          <a:xfrm>
+            <a:off x="2382257" y="5300588"/>
+            <a:ext cx="1218407" cy="0"/>
+          </a:xfrm>
+          <a:prstGeom prst="straightConnector1">
+            <a:avLst/>
+          </a:prstGeom>
+          <a:ln w="57150" cmpd="sng">
+            <a:solidFill>
+              <a:schemeClr val="accent2"/>
+            </a:solidFill>
+            <a:headEnd type="none"/>
+            <a:tailEnd type="triangle"/>
+          </a:ln>
+          <a:effectLst/>
+        </p:spPr>
+        <p:style>
+          <a:lnRef idx="2">
+            <a:schemeClr val="accent1"/>
+          </a:lnRef>
+          <a:fillRef idx="0">
+            <a:schemeClr val="accent1"/>
+          </a:fillRef>
+          <a:effectRef idx="1">
+            <a:schemeClr val="accent1"/>
+          </a:effectRef>
+          <a:fontRef idx="minor">
+            <a:schemeClr val="tx1"/>
+          </a:fontRef>
+        </p:style>
+      </p:cxnSp>
+      <p:sp>
+        <p:nvSpPr>
+          <p:cNvPr id="18" name="Rectangle 17"/>
+          <p:cNvSpPr/>
+          <p:nvPr/>
+        </p:nvSpPr>
+        <p:spPr>
+          <a:xfrm>
+            <a:off x="702737" y="5093893"/>
+            <a:ext cx="1730320" cy="396667"/>
+          </a:xfrm>
+          <a:prstGeom prst="rect">
+            <a:avLst/>
+          </a:prstGeom>
+          <a:solidFill>
+            <a:schemeClr val="accent5"/>
+          </a:solidFill>
+          <a:ln w="28575" cmpd="sng">
+            <a:solidFill>
+              <a:schemeClr val="accent1"/>
+            </a:solidFill>
+          </a:ln>
+          <a:effectLst/>
+        </p:spPr>
+        <p:style>
+          <a:lnRef idx="1">
+            <a:schemeClr val="accent1"/>
+          </a:lnRef>
+          <a:fillRef idx="3">
+            <a:schemeClr val="accent1"/>
+          </a:fillRef>
+          <a:effectRef idx="2">
+            <a:schemeClr val="accent1"/>
+          </a:effectRef>
+          <a:fontRef idx="minor">
+            <a:schemeClr val="lt1"/>
+          </a:fontRef>
+        </p:style>
+        <p:txBody>
+          <a:bodyPr rtlCol="0" anchor="ctr"/>
+          <a:lstStyle/>
+          <a:p>
+            <a:pPr algn="ctr"/>
+            <a:r>
+              <a:rPr lang="en-US" dirty="0" smtClean="0">
+                <a:solidFill>
+                  <a:srgbClr val="F8F8F8"/>
+                </a:solidFill>
+              </a:rPr>
+              <a:t>return data</a:t>
+            </a:r>
+            <a:endParaRPr lang="en-US" dirty="0">
+              <a:solidFill>
+                <a:srgbClr val="F8F8F8"/>
+              </a:solidFill>
+            </a:endParaRPr>
+          </a:p>
+        </p:txBody>
+      </p:sp>
+      <p:sp>
+        <p:nvSpPr>
+          <p:cNvPr id="22" name="Rectangle 21"/>
+          <p:cNvSpPr/>
+          <p:nvPr/>
+        </p:nvSpPr>
+        <p:spPr>
+          <a:xfrm>
+            <a:off x="6755607" y="5102254"/>
+            <a:ext cx="1730320" cy="396667"/>
+          </a:xfrm>
+          <a:prstGeom prst="rect">
+            <a:avLst/>
+          </a:prstGeom>
+          <a:solidFill>
+            <a:schemeClr val="accent6"/>
+          </a:solidFill>
+          <a:ln w="28575" cmpd="sng">
+            <a:solidFill>
+              <a:schemeClr val="accent1"/>
+            </a:solidFill>
+          </a:ln>
+          <a:effectLst/>
+        </p:spPr>
+        <p:style>
+          <a:lnRef idx="1">
+            <a:schemeClr val="accent1"/>
+          </a:lnRef>
+          <a:fillRef idx="3">
+            <a:schemeClr val="accent1"/>
+          </a:fillRef>
+          <a:effectRef idx="2">
+            <a:schemeClr val="accent1"/>
+          </a:effectRef>
+          <a:fontRef idx="minor">
+            <a:schemeClr val="lt1"/>
+          </a:fontRef>
+        </p:style>
+        <p:txBody>
+          <a:bodyPr rtlCol="0" anchor="ctr"/>
+          <a:lstStyle/>
+          <a:p>
+            <a:pPr algn="ctr"/>
+            <a:r>
+              <a:rPr lang="en-US" dirty="0" smtClean="0">
+                <a:solidFill>
+                  <a:srgbClr val="F8F8F8"/>
+                </a:solidFill>
+              </a:rPr>
+              <a:t>display data</a:t>
+            </a:r>
+            <a:endParaRPr lang="en-US" dirty="0">
+              <a:solidFill>
+                <a:srgbClr val="F8F8F8"/>
+              </a:solidFill>
+            </a:endParaRPr>
+          </a:p>
+        </p:txBody>
+      </p:sp>
+      <p:cxnSp>
+        <p:nvCxnSpPr>
+          <p:cNvPr id="23" name="Straight Arrow Connector 22"/>
+          <p:cNvCxnSpPr/>
+          <p:nvPr/>
+        </p:nvCxnSpPr>
+        <p:spPr>
+          <a:xfrm>
+            <a:off x="5430257" y="5300588"/>
+            <a:ext cx="1218407" cy="0"/>
+          </a:xfrm>
+          <a:prstGeom prst="straightConnector1">
+            <a:avLst/>
+          </a:prstGeom>
+          <a:ln w="57150" cmpd="sng">
+            <a:solidFill>
+              <a:schemeClr val="accent2"/>
+            </a:solidFill>
+            <a:headEnd type="none"/>
+            <a:tailEnd type="triangle"/>
+          </a:ln>
+          <a:effectLst/>
+        </p:spPr>
+        <p:style>
+          <a:lnRef idx="2">
+            <a:schemeClr val="accent1"/>
+          </a:lnRef>
+          <a:fillRef idx="0">
+            <a:schemeClr val="accent1"/>
+          </a:fillRef>
+          <a:effectRef idx="1">
+            <a:schemeClr val="accent1"/>
+          </a:effectRef>
+          <a:fontRef idx="minor">
+            <a:schemeClr val="tx1"/>
+          </a:fontRef>
+        </p:style>
+      </p:cxnSp>
+      <p:sp>
+        <p:nvSpPr>
+          <p:cNvPr id="20" name="Rectangle 19"/>
+          <p:cNvSpPr/>
+          <p:nvPr/>
+        </p:nvSpPr>
+        <p:spPr>
+          <a:xfrm>
+            <a:off x="3699937" y="5093893"/>
+            <a:ext cx="1730320" cy="396667"/>
+          </a:xfrm>
+          <a:prstGeom prst="rect">
+            <a:avLst/>
+          </a:prstGeom>
+          <a:solidFill>
+            <a:schemeClr val="accent4"/>
+          </a:solidFill>
+          <a:ln w="28575" cmpd="sng">
+            <a:solidFill>
+              <a:schemeClr val="accent1"/>
+            </a:solidFill>
+          </a:ln>
+          <a:effectLst/>
+        </p:spPr>
+        <p:style>
+          <a:lnRef idx="1">
+            <a:schemeClr val="accent1"/>
+          </a:lnRef>
+          <a:fillRef idx="3">
+            <a:schemeClr val="accent1"/>
+          </a:fillRef>
+          <a:effectRef idx="2">
+            <a:schemeClr val="accent1"/>
+          </a:effectRef>
+          <a:fontRef idx="minor">
+            <a:schemeClr val="lt1"/>
+          </a:fontRef>
+        </p:style>
+        <p:txBody>
+          <a:bodyPr rtlCol="0" anchor="ctr"/>
+          <a:lstStyle/>
+          <a:p>
+            <a:pPr algn="ctr"/>
+            <a:r>
+              <a:rPr lang="en-US" dirty="0" smtClean="0">
+                <a:solidFill>
+                  <a:srgbClr val="F8F8F8"/>
+                </a:solidFill>
+              </a:rPr>
+              <a:t>forward data</a:t>
+            </a:r>
+            <a:endParaRPr lang="en-US" dirty="0">
+              <a:solidFill>
+                <a:srgbClr val="F8F8F8"/>
+              </a:solidFill>
+            </a:endParaRPr>
+          </a:p>
+        </p:txBody>
+      </p:sp>
+      <p:cxnSp>
+        <p:nvCxnSpPr>
+          <p:cNvPr id="24" name="Straight Arrow Connector 23"/>
+          <p:cNvCxnSpPr/>
+          <p:nvPr/>
+        </p:nvCxnSpPr>
+        <p:spPr>
+          <a:xfrm>
+            <a:off x="5430257" y="3056995"/>
+            <a:ext cx="1325350" cy="0"/>
+          </a:xfrm>
+          <a:prstGeom prst="straightConnector1">
+            <a:avLst/>
+          </a:prstGeom>
+          <a:ln w="57150" cmpd="sng">
+            <a:solidFill>
+              <a:schemeClr val="accent2"/>
+            </a:solidFill>
+            <a:headEnd type="none"/>
+            <a:tailEnd type="triangle"/>
+          </a:ln>
+          <a:effectLst/>
+        </p:spPr>
+        <p:style>
+          <a:lnRef idx="2">
+            <a:schemeClr val="accent1"/>
+          </a:lnRef>
+          <a:fillRef idx="0">
+            <a:schemeClr val="accent1"/>
+          </a:fillRef>
+          <a:effectRef idx="1">
+            <a:schemeClr val="accent1"/>
+          </a:effectRef>
+          <a:fontRef idx="minor">
+            <a:schemeClr val="tx1"/>
+          </a:fontRef>
+        </p:style>
+      </p:cxnSp>
+      <p:cxnSp>
+        <p:nvCxnSpPr>
+          <p:cNvPr id="26" name="Straight Arrow Connector 25"/>
+          <p:cNvCxnSpPr/>
+          <p:nvPr/>
+        </p:nvCxnSpPr>
+        <p:spPr>
+          <a:xfrm>
+            <a:off x="7619091" y="2941410"/>
+            <a:ext cx="0" cy="614240"/>
+          </a:xfrm>
+          <a:prstGeom prst="straightConnector1">
+            <a:avLst/>
+          </a:prstGeom>
+          <a:ln w="57150" cmpd="sng">
+            <a:solidFill>
+              <a:schemeClr val="accent2"/>
+            </a:solidFill>
+            <a:headEnd type="none"/>
+            <a:tailEnd type="triangle"/>
+          </a:ln>
+          <a:effectLst/>
+        </p:spPr>
+        <p:style>
+          <a:lnRef idx="2">
+            <a:schemeClr val="accent1"/>
+          </a:lnRef>
+          <a:fillRef idx="0">
+            <a:schemeClr val="accent1"/>
+          </a:fillRef>
+          <a:effectRef idx="1">
+            <a:schemeClr val="accent1"/>
+          </a:effectRef>
+          <a:fontRef idx="minor">
+            <a:schemeClr val="tx1"/>
+          </a:fontRef>
+        </p:style>
+      </p:cxnSp>
+      <p:sp>
+        <p:nvSpPr>
+          <p:cNvPr id="25" name="Rectangle 24"/>
+          <p:cNvSpPr/>
+          <p:nvPr/>
+        </p:nvSpPr>
+        <p:spPr>
+          <a:xfrm>
+            <a:off x="6755607" y="2858661"/>
+            <a:ext cx="1730320" cy="396667"/>
+          </a:xfrm>
+          <a:prstGeom prst="rect">
+            <a:avLst/>
+          </a:prstGeom>
+          <a:solidFill>
+            <a:schemeClr val="accent6"/>
+          </a:solidFill>
+          <a:ln w="28575" cmpd="sng">
+            <a:solidFill>
+              <a:schemeClr val="accent1"/>
+            </a:solidFill>
+          </a:ln>
+          <a:effectLst/>
+        </p:spPr>
+        <p:style>
+          <a:lnRef idx="1">
+            <a:schemeClr val="accent1"/>
+          </a:lnRef>
+          <a:fillRef idx="3">
+            <a:schemeClr val="accent1"/>
+          </a:fillRef>
+          <a:effectRef idx="2">
+            <a:schemeClr val="accent1"/>
+          </a:effectRef>
+          <a:fontRef idx="minor">
+            <a:schemeClr val="lt1"/>
+          </a:fontRef>
+        </p:style>
+        <p:txBody>
+          <a:bodyPr rtlCol="0" anchor="ctr"/>
+          <a:lstStyle/>
+          <a:p>
+            <a:pPr algn="ctr"/>
+            <a:r>
+              <a:rPr lang="en-US" dirty="0">
+                <a:solidFill>
+                  <a:srgbClr val="F8F8F8"/>
+                </a:solidFill>
+              </a:rPr>
+              <a:t>p</a:t>
+            </a:r>
+            <a:r>
+              <a:rPr lang="en-US" dirty="0" smtClean="0">
+                <a:solidFill>
+                  <a:srgbClr val="F8F8F8"/>
+                </a:solidFill>
+              </a:rPr>
+              <a:t>rompt user</a:t>
+            </a:r>
+            <a:endParaRPr lang="en-US" dirty="0">
+              <a:solidFill>
+                <a:srgbClr val="F8F8F8"/>
+              </a:solidFill>
+            </a:endParaRPr>
+          </a:p>
+        </p:txBody>
+      </p:sp>
+      <p:sp>
+        <p:nvSpPr>
+          <p:cNvPr id="27" name="Rectangle 26"/>
+          <p:cNvSpPr/>
+          <p:nvPr/>
+        </p:nvSpPr>
+        <p:spPr>
+          <a:xfrm>
+            <a:off x="3699937" y="2858661"/>
+            <a:ext cx="1730320" cy="396667"/>
+          </a:xfrm>
+          <a:prstGeom prst="rect">
+            <a:avLst/>
+          </a:prstGeom>
+          <a:solidFill>
+            <a:schemeClr val="accent4"/>
+          </a:solidFill>
+          <a:ln w="28575" cmpd="sng">
+            <a:solidFill>
+              <a:schemeClr val="accent1"/>
+            </a:solidFill>
+          </a:ln>
+          <a:effectLst/>
+        </p:spPr>
+        <p:style>
+          <a:lnRef idx="1">
+            <a:schemeClr val="accent1"/>
+          </a:lnRef>
+          <a:fillRef idx="3">
+            <a:schemeClr val="accent1"/>
+          </a:fillRef>
+          <a:effectRef idx="2">
+            <a:schemeClr val="accent1"/>
+          </a:effectRef>
+          <a:fontRef idx="minor">
+            <a:schemeClr val="lt1"/>
+          </a:fontRef>
+        </p:style>
+        <p:txBody>
+          <a:bodyPr rtlCol="0" anchor="ctr"/>
+          <a:lstStyle/>
+          <a:p>
+            <a:pPr algn="ctr"/>
+            <a:r>
+              <a:rPr lang="en-US" dirty="0" smtClean="0">
+                <a:solidFill>
+                  <a:srgbClr val="F8F8F8"/>
+                </a:solidFill>
+              </a:rPr>
+              <a:t>Initiate Program</a:t>
+            </a:r>
+            <a:endParaRPr lang="en-US" dirty="0">
+              <a:solidFill>
+                <a:srgbClr val="F8F8F8"/>
+              </a:solidFill>
+            </a:endParaRPr>
+          </a:p>
+        </p:txBody>
+      </p:sp>
+      <p:sp>
+        <p:nvSpPr>
+          <p:cNvPr id="35" name="Rectangle 34"/>
+          <p:cNvSpPr/>
+          <p:nvPr/>
+        </p:nvSpPr>
+        <p:spPr>
+          <a:xfrm>
+            <a:off x="702737" y="2862107"/>
+            <a:ext cx="1730320" cy="396667"/>
+          </a:xfrm>
+          <a:prstGeom prst="rect">
+            <a:avLst/>
+          </a:prstGeom>
+          <a:solidFill>
+            <a:schemeClr val="accent5"/>
+          </a:solidFill>
+          <a:ln w="28575" cmpd="sng">
+            <a:solidFill>
+              <a:schemeClr val="accent1"/>
+            </a:solidFill>
+          </a:ln>
+          <a:effectLst/>
+        </p:spPr>
+        <p:style>
+          <a:lnRef idx="1">
+            <a:schemeClr val="accent1"/>
+          </a:lnRef>
+          <a:fillRef idx="3">
+            <a:schemeClr val="accent1"/>
+          </a:fillRef>
+          <a:effectRef idx="2">
+            <a:schemeClr val="accent1"/>
+          </a:effectRef>
+          <a:fontRef idx="minor">
+            <a:schemeClr val="lt1"/>
+          </a:fontRef>
+        </p:style>
+        <p:txBody>
+          <a:bodyPr rtlCol="0" anchor="ctr"/>
+          <a:lstStyle/>
+          <a:p>
+            <a:pPr algn="ctr"/>
+            <a:r>
+              <a:rPr lang="en-US" dirty="0">
+                <a:solidFill>
+                  <a:srgbClr val="F8F8F8"/>
+                </a:solidFill>
+              </a:rPr>
+              <a:t>i</a:t>
+            </a:r>
+            <a:r>
+              <a:rPr lang="en-US" dirty="0" smtClean="0">
+                <a:solidFill>
+                  <a:srgbClr val="F8F8F8"/>
+                </a:solidFill>
+              </a:rPr>
+              <a:t>nitiate data </a:t>
+            </a:r>
+            <a:endParaRPr lang="en-US" dirty="0">
+              <a:solidFill>
+                <a:srgbClr val="F8F8F8"/>
+              </a:solidFill>
+            </a:endParaRPr>
+          </a:p>
+        </p:txBody>
+      </p:sp>
+    </p:spTree>
+    <p:extLst>
+      <p:ext uri="{BB962C8B-B14F-4D97-AF65-F5344CB8AC3E}">
+        <p14:creationId xmlns:p14="http://schemas.microsoft.com/office/powerpoint/2010/main" val="1743989980"/>
+      </p:ext>
+    </p:extLst>
+  </p:cSld>
+  <p:clrMapOvr>
+    <a:masterClrMapping/>
+  </p:clrMapOvr>
+  <p:timing>
+    <p:tnLst>
+      <p:par>
+        <p:cTn xmlns:p14="http://schemas.microsoft.com/office/powerpoint/2010/main" id="1" dur="indefinite" restart="never" nodeType="tmRoot"/>
+      </p:par>
+    </p:tnLst>
+  </p:timing>
+</p:sld>
+</file>
+
+<file path=ppt/slides/slide38.xml><?xml version="1.0" encoding="utf-8"?>
+<p:sld xmlns:a="http://schemas.openxmlformats.org/drawingml/2006/main" xmlns:r="http://schemas.openxmlformats.org/officeDocument/2006/relationships" xmlns:p="http://schemas.openxmlformats.org/presentationml/2006/main">
+  <p:cSld>
+    <p:spTree>
+      <p:nvGrpSpPr>
+        <p:cNvPr id="1" name=""/>
+        <p:cNvGrpSpPr/>
+        <p:nvPr/>
+      </p:nvGrpSpPr>
+      <p:grpSpPr>
+        <a:xfrm>
+          <a:off x="0" y="0"/>
+          <a:ext cx="0" cy="0"/>
+          <a:chOff x="0" y="0"/>
+          <a:chExt cx="0" cy="0"/>
+        </a:xfrm>
+      </p:grpSpPr>
+      <p:sp>
+        <p:nvSpPr>
+          <p:cNvPr id="2" name="Title 1"/>
+          <p:cNvSpPr>
+            <a:spLocks noGrp="1"/>
+          </p:cNvSpPr>
+          <p:nvPr>
+            <p:ph type="title"/>
+          </p:nvPr>
+        </p:nvSpPr>
+        <p:spPr>
+          <a:xfrm>
+            <a:off x="285416" y="105308"/>
+            <a:ext cx="8648090" cy="1143000"/>
+          </a:xfrm>
+        </p:spPr>
+        <p:txBody>
+          <a:bodyPr>
             <a:normAutofit fontScale="90000"/>
           </a:bodyPr>
           <a:lstStyle/>
@@ -17598,7 +17755,7 @@
 </p:sld>
 </file>
 
-<file path=ppt/slides/slide38.xml><?xml version="1.0" encoding="utf-8"?>
+<file path=ppt/slides/slide39.xml><?xml version="1.0" encoding="utf-8"?>
 <p:sld xmlns:a="http://schemas.openxmlformats.org/drawingml/2006/main" xmlns:r="http://schemas.openxmlformats.org/officeDocument/2006/relationships" xmlns:p="http://schemas.openxmlformats.org/presentationml/2006/main">
   <p:cSld>
     <p:spTree>
@@ -17883,7 +18040,15 @@
             </a:r>
             <a:r>
               <a:rPr lang="en-US" dirty="0"/>
-              <a:t>design pattern is a general reusable solution to a commonly occurring problem within a given context </a:t>
+              <a:t>design </a:t>
+            </a:r>
+            <a:r>
+              <a:rPr lang="en-US" dirty="0" smtClean="0"/>
+              <a:t>pattern </a:t>
+            </a:r>
+            <a:r>
+              <a:rPr lang="en-US" dirty="0"/>
+              <a:t>is a general reusable solution to a commonly occurring problem within a given context </a:t>
             </a:r>
             <a:r>
               <a:rPr lang="en-US" dirty="0" smtClean="0"/>

</xml_diff>